<commit_message>
Added Entity-Framework, SQL database and wrote code for adding an entry
SQL Server was set up by SQLServer Express.
</commit_message>
<xml_diff>
--- a/financemanager_drawings.pptx
+++ b/financemanager_drawings.pptx
@@ -6,7 +6,9 @@
   </p:sldMasterIdLst>
   <p:sldIdLst>
     <p:sldId id="256" r:id="rId2"/>
-    <p:sldId id="257" r:id="rId3"/>
+    <p:sldId id="259" r:id="rId3"/>
+    <p:sldId id="257" r:id="rId4"/>
+    <p:sldId id="258" r:id="rId5"/>
   </p:sldIdLst>
   <p:sldSz cx="12192000" cy="6858000"/>
   <p:notesSz cx="6858000" cy="9144000"/>
@@ -105,6 +107,11 @@
       </a:defRPr>
     </a:lvl9pPr>
   </p:defaultTextStyle>
+  <p:extLst>
+    <p:ext uri="{EFAFB233-063F-42B5-8137-9DF3F51BA10A}">
+      <p15:sldGuideLst xmlns:p15="http://schemas.microsoft.com/office/powerpoint/2012/main"/>
+    </p:ext>
+  </p:extLst>
 </p:presentation>
 </file>
 
@@ -255,7 +262,7 @@
           <a:p>
             <a:fld id="{E526975C-EDE3-458D-AA92-E1518925717A}" type="datetimeFigureOut">
               <a:rPr lang="de-DE" smtClean="0"/>
-              <a:t>30.07.2023</a:t>
+              <a:t>20.08.2023</a:t>
             </a:fld>
             <a:endParaRPr lang="de-DE"/>
           </a:p>
@@ -453,7 +460,7 @@
           <a:p>
             <a:fld id="{E526975C-EDE3-458D-AA92-E1518925717A}" type="datetimeFigureOut">
               <a:rPr lang="de-DE" smtClean="0"/>
-              <a:t>30.07.2023</a:t>
+              <a:t>20.08.2023</a:t>
             </a:fld>
             <a:endParaRPr lang="de-DE"/>
           </a:p>
@@ -661,7 +668,7 @@
           <a:p>
             <a:fld id="{E526975C-EDE3-458D-AA92-E1518925717A}" type="datetimeFigureOut">
               <a:rPr lang="de-DE" smtClean="0"/>
-              <a:t>30.07.2023</a:t>
+              <a:t>20.08.2023</a:t>
             </a:fld>
             <a:endParaRPr lang="de-DE"/>
           </a:p>
@@ -859,7 +866,7 @@
           <a:p>
             <a:fld id="{E526975C-EDE3-458D-AA92-E1518925717A}" type="datetimeFigureOut">
               <a:rPr lang="de-DE" smtClean="0"/>
-              <a:t>30.07.2023</a:t>
+              <a:t>20.08.2023</a:t>
             </a:fld>
             <a:endParaRPr lang="de-DE"/>
           </a:p>
@@ -1134,7 +1141,7 @@
           <a:p>
             <a:fld id="{E526975C-EDE3-458D-AA92-E1518925717A}" type="datetimeFigureOut">
               <a:rPr lang="de-DE" smtClean="0"/>
-              <a:t>30.07.2023</a:t>
+              <a:t>20.08.2023</a:t>
             </a:fld>
             <a:endParaRPr lang="de-DE"/>
           </a:p>
@@ -1399,7 +1406,7 @@
           <a:p>
             <a:fld id="{E526975C-EDE3-458D-AA92-E1518925717A}" type="datetimeFigureOut">
               <a:rPr lang="de-DE" smtClean="0"/>
-              <a:t>30.07.2023</a:t>
+              <a:t>20.08.2023</a:t>
             </a:fld>
             <a:endParaRPr lang="de-DE"/>
           </a:p>
@@ -1811,7 +1818,7 @@
           <a:p>
             <a:fld id="{E526975C-EDE3-458D-AA92-E1518925717A}" type="datetimeFigureOut">
               <a:rPr lang="de-DE" smtClean="0"/>
-              <a:t>30.07.2023</a:t>
+              <a:t>20.08.2023</a:t>
             </a:fld>
             <a:endParaRPr lang="de-DE"/>
           </a:p>
@@ -1952,7 +1959,7 @@
           <a:p>
             <a:fld id="{E526975C-EDE3-458D-AA92-E1518925717A}" type="datetimeFigureOut">
               <a:rPr lang="de-DE" smtClean="0"/>
-              <a:t>30.07.2023</a:t>
+              <a:t>20.08.2023</a:t>
             </a:fld>
             <a:endParaRPr lang="de-DE"/>
           </a:p>
@@ -2065,7 +2072,7 @@
           <a:p>
             <a:fld id="{E526975C-EDE3-458D-AA92-E1518925717A}" type="datetimeFigureOut">
               <a:rPr lang="de-DE" smtClean="0"/>
-              <a:t>30.07.2023</a:t>
+              <a:t>20.08.2023</a:t>
             </a:fld>
             <a:endParaRPr lang="de-DE"/>
           </a:p>
@@ -2376,7 +2383,7 @@
           <a:p>
             <a:fld id="{E526975C-EDE3-458D-AA92-E1518925717A}" type="datetimeFigureOut">
               <a:rPr lang="de-DE" smtClean="0"/>
-              <a:t>30.07.2023</a:t>
+              <a:t>20.08.2023</a:t>
             </a:fld>
             <a:endParaRPr lang="de-DE"/>
           </a:p>
@@ -2664,7 +2671,7 @@
           <a:p>
             <a:fld id="{E526975C-EDE3-458D-AA92-E1518925717A}" type="datetimeFigureOut">
               <a:rPr lang="de-DE" smtClean="0"/>
-              <a:t>30.07.2023</a:t>
+              <a:t>20.08.2023</a:t>
             </a:fld>
             <a:endParaRPr lang="de-DE"/>
           </a:p>
@@ -2905,7 +2912,7 @@
           <a:p>
             <a:fld id="{E526975C-EDE3-458D-AA92-E1518925717A}" type="datetimeFigureOut">
               <a:rPr lang="de-DE" smtClean="0"/>
-              <a:t>30.07.2023</a:t>
+              <a:t>20.08.2023</a:t>
             </a:fld>
             <a:endParaRPr lang="de-DE"/>
           </a:p>
@@ -4293,6 +4300,751 @@
           <p:cNvPr id="2" name="Titel 1">
             <a:extLst>
               <a:ext uri="{FF2B5EF4-FFF2-40B4-BE49-F238E27FC236}">
+                <a16:creationId xmlns:a16="http://schemas.microsoft.com/office/drawing/2014/main" id="{A4E6B997-9961-FD63-EBEF-81786A3B4A70}"/>
+              </a:ext>
+            </a:extLst>
+          </p:cNvPr>
+          <p:cNvSpPr>
+            <a:spLocks noGrp="1"/>
+          </p:cNvSpPr>
+          <p:nvPr>
+            <p:ph type="title"/>
+          </p:nvPr>
+        </p:nvSpPr>
+        <p:spPr/>
+        <p:txBody>
+          <a:bodyPr/>
+          <a:lstStyle/>
+          <a:p>
+            <a:r>
+              <a:rPr lang="de-DE" dirty="0" err="1"/>
+              <a:t>Requirements</a:t>
+            </a:r>
+            <a:endParaRPr lang="de-DE" dirty="0"/>
+          </a:p>
+        </p:txBody>
+      </p:sp>
+      <p:sp>
+        <p:nvSpPr>
+          <p:cNvPr id="3" name="Inhaltsplatzhalter 2">
+            <a:extLst>
+              <a:ext uri="{FF2B5EF4-FFF2-40B4-BE49-F238E27FC236}">
+                <a16:creationId xmlns:a16="http://schemas.microsoft.com/office/drawing/2014/main" id="{4BA39C15-A8AA-B965-97E2-92AD4E12C6CC}"/>
+              </a:ext>
+            </a:extLst>
+          </p:cNvPr>
+          <p:cNvSpPr>
+            <a:spLocks noGrp="1"/>
+          </p:cNvSpPr>
+          <p:nvPr>
+            <p:ph idx="1"/>
+          </p:nvPr>
+        </p:nvSpPr>
+        <p:spPr/>
+        <p:txBody>
+          <a:bodyPr/>
+          <a:lstStyle/>
+          <a:p>
+            <a:r>
+              <a:rPr lang="de-DE" dirty="0"/>
+              <a:t>Analysis </a:t>
+            </a:r>
+            <a:r>
+              <a:rPr lang="de-DE" dirty="0" err="1"/>
+              <a:t>of</a:t>
+            </a:r>
+            <a:r>
+              <a:rPr lang="de-DE" dirty="0"/>
+              <a:t> </a:t>
+            </a:r>
+            <a:r>
+              <a:rPr lang="de-DE" dirty="0" err="1"/>
+              <a:t>bilance</a:t>
+            </a:r>
+            <a:r>
+              <a:rPr lang="de-DE" dirty="0"/>
+              <a:t> </a:t>
+            </a:r>
+            <a:r>
+              <a:rPr lang="de-DE" dirty="0" err="1"/>
+              <a:t>for</a:t>
+            </a:r>
+            <a:r>
+              <a:rPr lang="de-DE" dirty="0"/>
+              <a:t> private </a:t>
+            </a:r>
+            <a:r>
+              <a:rPr lang="de-DE" dirty="0" err="1"/>
+              <a:t>households</a:t>
+            </a:r>
+            <a:endParaRPr lang="de-DE" dirty="0"/>
+          </a:p>
+          <a:p>
+            <a:r>
+              <a:rPr lang="de-DE" dirty="0" err="1"/>
+              <a:t>Give</a:t>
+            </a:r>
+            <a:r>
+              <a:rPr lang="de-DE" dirty="0"/>
+              <a:t> </a:t>
+            </a:r>
+            <a:r>
+              <a:rPr lang="de-DE" dirty="0" err="1"/>
+              <a:t>overview</a:t>
+            </a:r>
+            <a:r>
+              <a:rPr lang="de-DE" dirty="0"/>
+              <a:t> </a:t>
+            </a:r>
+            <a:r>
+              <a:rPr lang="de-DE" dirty="0" err="1"/>
+              <a:t>of</a:t>
+            </a:r>
+            <a:r>
+              <a:rPr lang="de-DE" dirty="0"/>
+              <a:t> </a:t>
+            </a:r>
+            <a:r>
+              <a:rPr lang="de-DE" dirty="0" err="1"/>
+              <a:t>bilance</a:t>
+            </a:r>
+            <a:r>
+              <a:rPr lang="de-DE" dirty="0"/>
+              <a:t> </a:t>
+            </a:r>
+          </a:p>
+          <a:p>
+            <a:r>
+              <a:rPr lang="de-DE" dirty="0" err="1"/>
+              <a:t>Offer</a:t>
+            </a:r>
+            <a:r>
+              <a:rPr lang="de-DE" dirty="0"/>
+              <a:t> </a:t>
+            </a:r>
+            <a:r>
+              <a:rPr lang="de-DE" dirty="0" err="1"/>
+              <a:t>tools</a:t>
+            </a:r>
+            <a:r>
+              <a:rPr lang="de-DE" dirty="0"/>
+              <a:t> </a:t>
+            </a:r>
+            <a:r>
+              <a:rPr lang="de-DE" dirty="0" err="1"/>
+              <a:t>for</a:t>
+            </a:r>
+            <a:r>
+              <a:rPr lang="de-DE" dirty="0"/>
+              <a:t> </a:t>
+            </a:r>
+            <a:r>
+              <a:rPr lang="de-DE" dirty="0" err="1"/>
+              <a:t>bilance</a:t>
+            </a:r>
+            <a:r>
+              <a:rPr lang="de-DE" dirty="0"/>
+              <a:t> </a:t>
+            </a:r>
+            <a:r>
+              <a:rPr lang="de-DE" dirty="0" err="1"/>
+              <a:t>analysis</a:t>
+            </a:r>
+            <a:endParaRPr lang="de-DE" dirty="0"/>
+          </a:p>
+          <a:p>
+            <a:pPr lvl="1"/>
+            <a:r>
+              <a:rPr lang="de-DE" dirty="0" err="1"/>
+              <a:t>Characterization</a:t>
+            </a:r>
+            <a:r>
+              <a:rPr lang="de-DE" dirty="0"/>
+              <a:t> </a:t>
+            </a:r>
+            <a:r>
+              <a:rPr lang="de-DE" dirty="0" err="1"/>
+              <a:t>of</a:t>
+            </a:r>
+            <a:r>
+              <a:rPr lang="de-DE" dirty="0"/>
+              <a:t> </a:t>
+            </a:r>
+            <a:r>
+              <a:rPr lang="de-DE" dirty="0" err="1"/>
+              <a:t>transactions</a:t>
+            </a:r>
+            <a:endParaRPr lang="de-DE" dirty="0"/>
+          </a:p>
+          <a:p>
+            <a:pPr lvl="1"/>
+            <a:r>
+              <a:rPr lang="de-DE" dirty="0" err="1"/>
+              <a:t>Graphical</a:t>
+            </a:r>
+            <a:r>
+              <a:rPr lang="de-DE" dirty="0"/>
+              <a:t> </a:t>
+            </a:r>
+            <a:r>
+              <a:rPr lang="de-DE" dirty="0" err="1"/>
+              <a:t>representation</a:t>
+            </a:r>
+            <a:r>
+              <a:rPr lang="de-DE" dirty="0"/>
+              <a:t> </a:t>
+            </a:r>
+            <a:r>
+              <a:rPr lang="de-DE" dirty="0" err="1"/>
+              <a:t>of</a:t>
+            </a:r>
+            <a:r>
+              <a:rPr lang="de-DE" dirty="0"/>
+              <a:t> </a:t>
+            </a:r>
+            <a:r>
+              <a:rPr lang="de-DE" dirty="0" err="1"/>
+              <a:t>bilance</a:t>
+            </a:r>
+            <a:r>
+              <a:rPr lang="de-DE" dirty="0"/>
+              <a:t> </a:t>
+            </a:r>
+          </a:p>
+        </p:txBody>
+      </p:sp>
+      <p:grpSp>
+        <p:nvGrpSpPr>
+          <p:cNvPr id="25" name="Gruppieren 24">
+            <a:extLst>
+              <a:ext uri="{FF2B5EF4-FFF2-40B4-BE49-F238E27FC236}">
+                <a16:creationId xmlns:a16="http://schemas.microsoft.com/office/drawing/2014/main" id="{3B2198C7-9E22-DDE4-192B-12C4F76ACAD1}"/>
+              </a:ext>
+            </a:extLst>
+          </p:cNvPr>
+          <p:cNvGrpSpPr/>
+          <p:nvPr/>
+        </p:nvGrpSpPr>
+        <p:grpSpPr>
+          <a:xfrm>
+            <a:off x="8334756" y="2331779"/>
+            <a:ext cx="3467862" cy="2194442"/>
+            <a:chOff x="7566660" y="2499906"/>
+            <a:chExt cx="3467862" cy="2194442"/>
+          </a:xfrm>
+        </p:grpSpPr>
+        <p:grpSp>
+          <p:nvGrpSpPr>
+            <p:cNvPr id="17" name="Gruppieren 16">
+              <a:extLst>
+                <a:ext uri="{FF2B5EF4-FFF2-40B4-BE49-F238E27FC236}">
+                  <a16:creationId xmlns:a16="http://schemas.microsoft.com/office/drawing/2014/main" id="{BF51343C-F137-5AF6-B087-6BF746D7806E}"/>
+                </a:ext>
+              </a:extLst>
+            </p:cNvPr>
+            <p:cNvGrpSpPr/>
+            <p:nvPr/>
+          </p:nvGrpSpPr>
+          <p:grpSpPr>
+            <a:xfrm>
+              <a:off x="7958333" y="3644294"/>
+              <a:ext cx="779779" cy="779779"/>
+              <a:chOff x="6908268" y="3453566"/>
+              <a:chExt cx="1800000" cy="1800000"/>
+            </a:xfrm>
+          </p:grpSpPr>
+          <p:sp>
+            <p:nvSpPr>
+              <p:cNvPr id="4" name="Ellipse 3">
+                <a:extLst>
+                  <a:ext uri="{FF2B5EF4-FFF2-40B4-BE49-F238E27FC236}">
+                    <a16:creationId xmlns:a16="http://schemas.microsoft.com/office/drawing/2014/main" id="{BC4E6291-77A6-AA77-45DB-D7E6F153EDCA}"/>
+                  </a:ext>
+                </a:extLst>
+              </p:cNvPr>
+              <p:cNvSpPr/>
+              <p:nvPr/>
+            </p:nvSpPr>
+            <p:spPr>
+              <a:xfrm>
+                <a:off x="6908268" y="3453566"/>
+                <a:ext cx="1800000" cy="1800000"/>
+              </a:xfrm>
+              <a:prstGeom prst="ellipse">
+                <a:avLst/>
+              </a:prstGeom>
+              <a:solidFill>
+                <a:srgbClr val="FF0000"/>
+              </a:solidFill>
+              <a:ln w="38100">
+                <a:solidFill>
+                  <a:schemeClr val="tx1"/>
+                </a:solidFill>
+              </a:ln>
+            </p:spPr>
+            <p:style>
+              <a:lnRef idx="2">
+                <a:schemeClr val="accent1">
+                  <a:shade val="15000"/>
+                </a:schemeClr>
+              </a:lnRef>
+              <a:fillRef idx="1">
+                <a:schemeClr val="accent1"/>
+              </a:fillRef>
+              <a:effectRef idx="0">
+                <a:schemeClr val="accent1"/>
+              </a:effectRef>
+              <a:fontRef idx="minor">
+                <a:schemeClr val="lt1"/>
+              </a:fontRef>
+            </p:style>
+            <p:txBody>
+              <a:bodyPr rtlCol="0" anchor="ctr"/>
+              <a:lstStyle/>
+              <a:p>
+                <a:pPr algn="ctr"/>
+                <a:endParaRPr lang="de-DE"/>
+              </a:p>
+            </p:txBody>
+          </p:sp>
+          <p:sp>
+            <p:nvSpPr>
+              <p:cNvPr id="5" name="Teilkreis 4">
+                <a:extLst>
+                  <a:ext uri="{FF2B5EF4-FFF2-40B4-BE49-F238E27FC236}">
+                    <a16:creationId xmlns:a16="http://schemas.microsoft.com/office/drawing/2014/main" id="{A97602AC-7E75-73F1-2A4B-FB642EC3D919}"/>
+                  </a:ext>
+                </a:extLst>
+              </p:cNvPr>
+              <p:cNvSpPr/>
+              <p:nvPr/>
+            </p:nvSpPr>
+            <p:spPr>
+              <a:xfrm>
+                <a:off x="6908268" y="3453566"/>
+                <a:ext cx="1800000" cy="1800000"/>
+              </a:xfrm>
+              <a:prstGeom prst="pie">
+                <a:avLst/>
+              </a:prstGeom>
+              <a:solidFill>
+                <a:srgbClr val="00B050"/>
+              </a:solidFill>
+              <a:ln w="38100">
+                <a:solidFill>
+                  <a:schemeClr val="tx1"/>
+                </a:solidFill>
+              </a:ln>
+            </p:spPr>
+            <p:style>
+              <a:lnRef idx="2">
+                <a:schemeClr val="accent1">
+                  <a:shade val="15000"/>
+                </a:schemeClr>
+              </a:lnRef>
+              <a:fillRef idx="1">
+                <a:schemeClr val="accent1"/>
+              </a:fillRef>
+              <a:effectRef idx="0">
+                <a:schemeClr val="accent1"/>
+              </a:effectRef>
+              <a:fontRef idx="minor">
+                <a:schemeClr val="lt1"/>
+              </a:fontRef>
+            </p:style>
+            <p:txBody>
+              <a:bodyPr rtlCol="0" anchor="ctr"/>
+              <a:lstStyle/>
+              <a:p>
+                <a:pPr algn="ctr"/>
+                <a:endParaRPr lang="de-DE">
+                  <a:ln>
+                    <a:solidFill>
+                      <a:sysClr val="windowText" lastClr="000000"/>
+                    </a:solidFill>
+                  </a:ln>
+                  <a:solidFill>
+                    <a:schemeClr val="tx1"/>
+                  </a:solidFill>
+                </a:endParaRPr>
+              </a:p>
+            </p:txBody>
+          </p:sp>
+          <p:sp>
+            <p:nvSpPr>
+              <p:cNvPr id="6" name="Teilkreis 5">
+                <a:extLst>
+                  <a:ext uri="{FF2B5EF4-FFF2-40B4-BE49-F238E27FC236}">
+                    <a16:creationId xmlns:a16="http://schemas.microsoft.com/office/drawing/2014/main" id="{214660E8-412C-185F-E7F4-9F69C1601571}"/>
+                  </a:ext>
+                </a:extLst>
+              </p:cNvPr>
+              <p:cNvSpPr/>
+              <p:nvPr/>
+            </p:nvSpPr>
+            <p:spPr>
+              <a:xfrm>
+                <a:off x="6908268" y="3453566"/>
+                <a:ext cx="1800000" cy="1800000"/>
+              </a:xfrm>
+              <a:prstGeom prst="pie">
+                <a:avLst>
+                  <a:gd name="adj1" fmla="val 0"/>
+                  <a:gd name="adj2" fmla="val 6800364"/>
+                </a:avLst>
+              </a:prstGeom>
+              <a:solidFill>
+                <a:srgbClr val="0070C0"/>
+              </a:solidFill>
+              <a:ln w="38100">
+                <a:solidFill>
+                  <a:schemeClr val="tx1"/>
+                </a:solidFill>
+              </a:ln>
+            </p:spPr>
+            <p:style>
+              <a:lnRef idx="2">
+                <a:schemeClr val="accent1">
+                  <a:shade val="15000"/>
+                </a:schemeClr>
+              </a:lnRef>
+              <a:fillRef idx="1">
+                <a:schemeClr val="accent1"/>
+              </a:fillRef>
+              <a:effectRef idx="0">
+                <a:schemeClr val="accent1"/>
+              </a:effectRef>
+              <a:fontRef idx="minor">
+                <a:schemeClr val="lt1"/>
+              </a:fontRef>
+            </p:style>
+            <p:txBody>
+              <a:bodyPr rtlCol="0" anchor="ctr"/>
+              <a:lstStyle/>
+              <a:p>
+                <a:pPr algn="ctr"/>
+                <a:endParaRPr lang="de-DE">
+                  <a:ln>
+                    <a:solidFill>
+                      <a:sysClr val="windowText" lastClr="000000"/>
+                    </a:solidFill>
+                  </a:ln>
+                  <a:solidFill>
+                    <a:schemeClr val="tx1"/>
+                  </a:solidFill>
+                </a:endParaRPr>
+              </a:p>
+            </p:txBody>
+          </p:sp>
+        </p:grpSp>
+        <p:cxnSp>
+          <p:nvCxnSpPr>
+            <p:cNvPr id="8" name="Gerader Verbinder 7">
+              <a:extLst>
+                <a:ext uri="{FF2B5EF4-FFF2-40B4-BE49-F238E27FC236}">
+                  <a16:creationId xmlns:a16="http://schemas.microsoft.com/office/drawing/2014/main" id="{3B5F8519-0252-04C7-3AA9-63DE058BDE19}"/>
+                </a:ext>
+              </a:extLst>
+            </p:cNvPr>
+            <p:cNvCxnSpPr>
+              <a:cxnSpLocks/>
+            </p:cNvCxnSpPr>
+            <p:nvPr/>
+          </p:nvCxnSpPr>
+          <p:spPr>
+            <a:xfrm flipV="1">
+              <a:off x="8478774" y="3453566"/>
+              <a:ext cx="615696" cy="414346"/>
+            </a:xfrm>
+            <a:prstGeom prst="line">
+              <a:avLst/>
+            </a:prstGeom>
+            <a:ln w="38100">
+              <a:solidFill>
+                <a:schemeClr val="tx1"/>
+              </a:solidFill>
+            </a:ln>
+          </p:spPr>
+          <p:style>
+            <a:lnRef idx="1">
+              <a:schemeClr val="accent1"/>
+            </a:lnRef>
+            <a:fillRef idx="0">
+              <a:schemeClr val="accent1"/>
+            </a:fillRef>
+            <a:effectRef idx="0">
+              <a:schemeClr val="accent1"/>
+            </a:effectRef>
+            <a:fontRef idx="minor">
+              <a:schemeClr val="tx1"/>
+            </a:fontRef>
+          </p:style>
+        </p:cxnSp>
+        <p:cxnSp>
+          <p:nvCxnSpPr>
+            <p:cNvPr id="9" name="Gerader Verbinder 8">
+              <a:extLst>
+                <a:ext uri="{FF2B5EF4-FFF2-40B4-BE49-F238E27FC236}">
+                  <a16:creationId xmlns:a16="http://schemas.microsoft.com/office/drawing/2014/main" id="{CC37A162-B2DD-C711-EB62-50F314D6BBEA}"/>
+                </a:ext>
+              </a:extLst>
+            </p:cNvPr>
+            <p:cNvCxnSpPr>
+              <a:cxnSpLocks/>
+            </p:cNvCxnSpPr>
+            <p:nvPr/>
+          </p:nvCxnSpPr>
+          <p:spPr>
+            <a:xfrm flipH="1" flipV="1">
+              <a:off x="8110728" y="3213706"/>
+              <a:ext cx="98811" cy="758282"/>
+            </a:xfrm>
+            <a:prstGeom prst="line">
+              <a:avLst/>
+            </a:prstGeom>
+            <a:ln w="38100">
+              <a:solidFill>
+                <a:schemeClr val="tx1"/>
+              </a:solidFill>
+            </a:ln>
+          </p:spPr>
+          <p:style>
+            <a:lnRef idx="1">
+              <a:schemeClr val="accent1"/>
+            </a:lnRef>
+            <a:fillRef idx="0">
+              <a:schemeClr val="accent1"/>
+            </a:fillRef>
+            <a:effectRef idx="0">
+              <a:schemeClr val="accent1"/>
+            </a:effectRef>
+            <a:fontRef idx="minor">
+              <a:schemeClr val="tx1"/>
+            </a:fontRef>
+          </p:style>
+        </p:cxnSp>
+        <p:cxnSp>
+          <p:nvCxnSpPr>
+            <p:cNvPr id="10" name="Gerader Verbinder 9">
+              <a:extLst>
+                <a:ext uri="{FF2B5EF4-FFF2-40B4-BE49-F238E27FC236}">
+                  <a16:creationId xmlns:a16="http://schemas.microsoft.com/office/drawing/2014/main" id="{82AC228A-7C4D-137E-C294-3F545D056462}"/>
+                </a:ext>
+              </a:extLst>
+            </p:cNvPr>
+            <p:cNvCxnSpPr>
+              <a:cxnSpLocks/>
+            </p:cNvCxnSpPr>
+            <p:nvPr/>
+          </p:nvCxnSpPr>
+          <p:spPr>
+            <a:xfrm>
+              <a:off x="8361548" y="4206501"/>
+              <a:ext cx="732922" cy="237031"/>
+            </a:xfrm>
+            <a:prstGeom prst="line">
+              <a:avLst/>
+            </a:prstGeom>
+            <a:ln w="38100">
+              <a:solidFill>
+                <a:schemeClr val="tx1"/>
+              </a:solidFill>
+            </a:ln>
+          </p:spPr>
+          <p:style>
+            <a:lnRef idx="1">
+              <a:schemeClr val="accent1"/>
+            </a:lnRef>
+            <a:fillRef idx="0">
+              <a:schemeClr val="accent1"/>
+            </a:fillRef>
+            <a:effectRef idx="0">
+              <a:schemeClr val="accent1"/>
+            </a:effectRef>
+            <a:fontRef idx="minor">
+              <a:schemeClr val="tx1"/>
+            </a:fontRef>
+          </p:style>
+        </p:cxnSp>
+        <p:sp>
+          <p:nvSpPr>
+            <p:cNvPr id="14" name="Textfeld 13">
+              <a:extLst>
+                <a:ext uri="{FF2B5EF4-FFF2-40B4-BE49-F238E27FC236}">
+                  <a16:creationId xmlns:a16="http://schemas.microsoft.com/office/drawing/2014/main" id="{524E7018-B15B-D79B-673A-10BA84470A82}"/>
+                </a:ext>
+              </a:extLst>
+            </p:cNvPr>
+            <p:cNvSpPr txBox="1"/>
+            <p:nvPr/>
+          </p:nvSpPr>
+          <p:spPr>
+            <a:xfrm>
+              <a:off x="7566660" y="2499906"/>
+              <a:ext cx="1824228" cy="646331"/>
+            </a:xfrm>
+            <a:prstGeom prst="rect">
+              <a:avLst/>
+            </a:prstGeom>
+            <a:noFill/>
+          </p:spPr>
+          <p:txBody>
+            <a:bodyPr wrap="square" rtlCol="0">
+              <a:spAutoFit/>
+            </a:bodyPr>
+            <a:lstStyle/>
+            <a:p>
+              <a:r>
+                <a:rPr lang="de-DE" dirty="0" err="1"/>
+                <a:t>Groceries</a:t>
+              </a:r>
+              <a:r>
+                <a:rPr lang="de-DE" dirty="0"/>
+                <a:t>, </a:t>
+              </a:r>
+              <a:r>
+                <a:rPr lang="de-DE" dirty="0" err="1"/>
+                <a:t>single</a:t>
+              </a:r>
+              <a:r>
+                <a:rPr lang="de-DE" dirty="0"/>
+                <a:t> </a:t>
+              </a:r>
+              <a:r>
+                <a:rPr lang="de-DE" dirty="0" err="1"/>
+                <a:t>payments</a:t>
+              </a:r>
+              <a:endParaRPr lang="de-DE" dirty="0"/>
+            </a:p>
+          </p:txBody>
+        </p:sp>
+        <p:sp>
+          <p:nvSpPr>
+            <p:cNvPr id="15" name="Textfeld 14">
+              <a:extLst>
+                <a:ext uri="{FF2B5EF4-FFF2-40B4-BE49-F238E27FC236}">
+                  <a16:creationId xmlns:a16="http://schemas.microsoft.com/office/drawing/2014/main" id="{378419F0-09AB-AC45-7B0D-2F3498A4F61D}"/>
+                </a:ext>
+              </a:extLst>
+            </p:cNvPr>
+            <p:cNvSpPr txBox="1"/>
+            <p:nvPr/>
+          </p:nvSpPr>
+          <p:spPr>
+            <a:xfrm>
+              <a:off x="9210294" y="2890540"/>
+              <a:ext cx="1824228" cy="646331"/>
+            </a:xfrm>
+            <a:prstGeom prst="rect">
+              <a:avLst/>
+            </a:prstGeom>
+            <a:noFill/>
+          </p:spPr>
+          <p:txBody>
+            <a:bodyPr wrap="square" rtlCol="0">
+              <a:spAutoFit/>
+            </a:bodyPr>
+            <a:lstStyle/>
+            <a:p>
+              <a:r>
+                <a:rPr lang="de-DE" dirty="0" err="1"/>
+                <a:t>Rent</a:t>
+              </a:r>
+              <a:r>
+                <a:rPr lang="de-DE" dirty="0"/>
+                <a:t>, </a:t>
+              </a:r>
+              <a:r>
+                <a:rPr lang="de-DE" dirty="0" err="1"/>
+                <a:t>electricity</a:t>
+              </a:r>
+              <a:r>
+                <a:rPr lang="de-DE" dirty="0"/>
+                <a:t>, </a:t>
+              </a:r>
+              <a:r>
+                <a:rPr lang="de-DE" dirty="0" err="1"/>
+                <a:t>internet</a:t>
+              </a:r>
+              <a:r>
+                <a:rPr lang="de-DE" dirty="0"/>
+                <a:t> etc.  </a:t>
+              </a:r>
+            </a:p>
+          </p:txBody>
+        </p:sp>
+        <p:sp>
+          <p:nvSpPr>
+            <p:cNvPr id="16" name="Textfeld 15">
+              <a:extLst>
+                <a:ext uri="{FF2B5EF4-FFF2-40B4-BE49-F238E27FC236}">
+                  <a16:creationId xmlns:a16="http://schemas.microsoft.com/office/drawing/2014/main" id="{8E427928-C949-E12B-8E77-82EB3BDCFD1A}"/>
+                </a:ext>
+              </a:extLst>
+            </p:cNvPr>
+            <p:cNvSpPr txBox="1"/>
+            <p:nvPr/>
+          </p:nvSpPr>
+          <p:spPr>
+            <a:xfrm>
+              <a:off x="9094470" y="4325016"/>
+              <a:ext cx="1824228" cy="369332"/>
+            </a:xfrm>
+            <a:prstGeom prst="rect">
+              <a:avLst/>
+            </a:prstGeom>
+            <a:noFill/>
+          </p:spPr>
+          <p:txBody>
+            <a:bodyPr wrap="square" rtlCol="0">
+              <a:spAutoFit/>
+            </a:bodyPr>
+            <a:lstStyle/>
+            <a:p>
+              <a:r>
+                <a:rPr lang="de-DE" dirty="0" err="1"/>
+                <a:t>Miscellanous</a:t>
+              </a:r>
+              <a:endParaRPr lang="de-DE" dirty="0"/>
+            </a:p>
+          </p:txBody>
+        </p:sp>
+      </p:grpSp>
+    </p:spTree>
+    <p:extLst>
+      <p:ext uri="{BB962C8B-B14F-4D97-AF65-F5344CB8AC3E}">
+        <p14:creationId xmlns:p14="http://schemas.microsoft.com/office/powerpoint/2010/main" val="3589345716"/>
+      </p:ext>
+    </p:extLst>
+  </p:cSld>
+  <p:clrMapOvr>
+    <a:masterClrMapping/>
+  </p:clrMapOvr>
+</p:sld>
+</file>
+
+<file path=ppt/slides/slide3.xml><?xml version="1.0" encoding="utf-8"?>
+<p:sld xmlns:a="http://schemas.openxmlformats.org/drawingml/2006/main" xmlns:r="http://schemas.openxmlformats.org/officeDocument/2006/relationships" xmlns:p="http://schemas.openxmlformats.org/presentationml/2006/main">
+  <p:cSld>
+    <p:spTree>
+      <p:nvGrpSpPr>
+        <p:cNvPr id="1" name=""/>
+        <p:cNvGrpSpPr/>
+        <p:nvPr/>
+      </p:nvGrpSpPr>
+      <p:grpSpPr>
+        <a:xfrm>
+          <a:off x="0" y="0"/>
+          <a:ext cx="0" cy="0"/>
+          <a:chOff x="0" y="0"/>
+          <a:chExt cx="0" cy="0"/>
+        </a:xfrm>
+      </p:grpSpPr>
+      <p:sp>
+        <p:nvSpPr>
+          <p:cNvPr id="2" name="Titel 1">
+            <a:extLst>
+              <a:ext uri="{FF2B5EF4-FFF2-40B4-BE49-F238E27FC236}">
                 <a16:creationId xmlns:a16="http://schemas.microsoft.com/office/drawing/2014/main" id="{E249F39E-40D7-69A2-AD64-9A4210469EF7}"/>
               </a:ext>
             </a:extLst>
@@ -5027,6 +5779,198 @@
     <p:extLst>
       <p:ext uri="{BB962C8B-B14F-4D97-AF65-F5344CB8AC3E}">
         <p14:creationId xmlns:p14="http://schemas.microsoft.com/office/powerpoint/2010/main" val="3377676410"/>
+      </p:ext>
+    </p:extLst>
+  </p:cSld>
+  <p:clrMapOvr>
+    <a:masterClrMapping/>
+  </p:clrMapOvr>
+</p:sld>
+</file>
+
+<file path=ppt/slides/slide4.xml><?xml version="1.0" encoding="utf-8"?>
+<p:sld xmlns:a="http://schemas.openxmlformats.org/drawingml/2006/main" xmlns:r="http://schemas.openxmlformats.org/officeDocument/2006/relationships" xmlns:p="http://schemas.openxmlformats.org/presentationml/2006/main">
+  <p:cSld>
+    <p:spTree>
+      <p:nvGrpSpPr>
+        <p:cNvPr id="1" name=""/>
+        <p:cNvGrpSpPr/>
+        <p:nvPr/>
+      </p:nvGrpSpPr>
+      <p:grpSpPr>
+        <a:xfrm>
+          <a:off x="0" y="0"/>
+          <a:ext cx="0" cy="0"/>
+          <a:chOff x="0" y="0"/>
+          <a:chExt cx="0" cy="0"/>
+        </a:xfrm>
+      </p:grpSpPr>
+      <p:sp>
+        <p:nvSpPr>
+          <p:cNvPr id="2" name="Titel 1">
+            <a:extLst>
+              <a:ext uri="{FF2B5EF4-FFF2-40B4-BE49-F238E27FC236}">
+                <a16:creationId xmlns:a16="http://schemas.microsoft.com/office/drawing/2014/main" id="{E12E6281-2E4C-B5E8-2D7E-A366D53F9D4A}"/>
+              </a:ext>
+            </a:extLst>
+          </p:cNvPr>
+          <p:cNvSpPr>
+            <a:spLocks noGrp="1"/>
+          </p:cNvSpPr>
+          <p:nvPr>
+            <p:ph type="title"/>
+          </p:nvPr>
+        </p:nvSpPr>
+        <p:spPr/>
+        <p:txBody>
+          <a:bodyPr/>
+          <a:lstStyle/>
+          <a:p>
+            <a:r>
+              <a:rPr lang="de-DE" dirty="0"/>
+              <a:t>Save </a:t>
+            </a:r>
+            <a:r>
+              <a:rPr lang="de-DE" dirty="0" err="1"/>
+              <a:t>buffer</a:t>
+            </a:r>
+            <a:r>
+              <a:rPr lang="de-DE" dirty="0"/>
+              <a:t>	</a:t>
+            </a:r>
+          </a:p>
+        </p:txBody>
+      </p:sp>
+      <p:sp>
+        <p:nvSpPr>
+          <p:cNvPr id="3" name="Inhaltsplatzhalter 2">
+            <a:extLst>
+              <a:ext uri="{FF2B5EF4-FFF2-40B4-BE49-F238E27FC236}">
+                <a16:creationId xmlns:a16="http://schemas.microsoft.com/office/drawing/2014/main" id="{B95F4190-D485-EB74-2211-B0EC73F77165}"/>
+              </a:ext>
+            </a:extLst>
+          </p:cNvPr>
+          <p:cNvSpPr>
+            <a:spLocks noGrp="1"/>
+          </p:cNvSpPr>
+          <p:nvPr>
+            <p:ph idx="1"/>
+          </p:nvPr>
+        </p:nvSpPr>
+        <p:spPr/>
+        <p:txBody>
+          <a:bodyPr/>
+          <a:lstStyle/>
+          <a:p>
+            <a:r>
+              <a:rPr lang="de-DE" dirty="0"/>
+              <a:t>Add </a:t>
+            </a:r>
+            <a:r>
+              <a:rPr lang="de-DE" dirty="0" err="1"/>
+              <a:t>entry</a:t>
+            </a:r>
+            <a:r>
+              <a:rPr lang="de-DE" dirty="0"/>
+              <a:t> </a:t>
+            </a:r>
+            <a:r>
+              <a:rPr lang="de-DE" dirty="0" err="1"/>
+              <a:t>added</a:t>
+            </a:r>
+            <a:r>
+              <a:rPr lang="de-DE" dirty="0"/>
+              <a:t> </a:t>
+            </a:r>
+            <a:r>
+              <a:rPr lang="de-DE" dirty="0" err="1"/>
+              <a:t>during</a:t>
+            </a:r>
+            <a:r>
+              <a:rPr lang="de-DE" dirty="0"/>
+              <a:t> in a </a:t>
+            </a:r>
+            <a:r>
+              <a:rPr lang="de-DE" dirty="0" err="1"/>
+              <a:t>list</a:t>
+            </a:r>
+            <a:r>
+              <a:rPr lang="de-DE" dirty="0"/>
+              <a:t>&lt;</a:t>
+            </a:r>
+            <a:r>
+              <a:rPr lang="de-DE" dirty="0" err="1"/>
+              <a:t>string</a:t>
+            </a:r>
+            <a:r>
+              <a:rPr lang="de-DE" dirty="0"/>
+              <a:t>&gt;</a:t>
+            </a:r>
+          </a:p>
+          <a:p>
+            <a:r>
+              <a:rPr lang="de-DE" dirty="0" err="1"/>
+              <a:t>Added</a:t>
+            </a:r>
+            <a:r>
+              <a:rPr lang="de-DE" dirty="0"/>
+              <a:t> </a:t>
+            </a:r>
+            <a:r>
+              <a:rPr lang="de-DE" dirty="0" err="1"/>
+              <a:t>entry</a:t>
+            </a:r>
+            <a:r>
+              <a:rPr lang="de-DE" dirty="0"/>
+              <a:t> </a:t>
+            </a:r>
+            <a:r>
+              <a:rPr lang="de-DE" dirty="0" err="1"/>
+              <a:t>needs</a:t>
+            </a:r>
+            <a:r>
+              <a:rPr lang="de-DE" dirty="0"/>
+              <a:t> to </a:t>
+            </a:r>
+            <a:r>
+              <a:rPr lang="de-DE" dirty="0" err="1"/>
+              <a:t>get</a:t>
+            </a:r>
+            <a:r>
+              <a:rPr lang="de-DE" dirty="0"/>
+              <a:t> </a:t>
+            </a:r>
+            <a:r>
+              <a:rPr lang="de-DE" dirty="0" err="1"/>
+              <a:t>the</a:t>
+            </a:r>
+            <a:r>
+              <a:rPr lang="de-DE" dirty="0"/>
+              <a:t> </a:t>
+            </a:r>
+            <a:r>
+              <a:rPr lang="de-DE" dirty="0" err="1"/>
+              <a:t>file</a:t>
+            </a:r>
+            <a:r>
+              <a:rPr lang="de-DE" dirty="0"/>
+              <a:t> </a:t>
+            </a:r>
+            <a:r>
+              <a:rPr lang="de-DE" dirty="0" err="1"/>
+              <a:t>extension</a:t>
+            </a:r>
+            <a:endParaRPr lang="de-DE" dirty="0"/>
+          </a:p>
+          <a:p>
+            <a:endParaRPr lang="de-DE" dirty="0"/>
+          </a:p>
+        </p:txBody>
+      </p:sp>
+    </p:spTree>
+    <p:extLst>
+      <p:ext uri="{BB962C8B-B14F-4D97-AF65-F5344CB8AC3E}">
+        <p14:creationId xmlns:p14="http://schemas.microsoft.com/office/powerpoint/2010/main" val="1637764307"/>
       </p:ext>
     </p:extLst>
   </p:cSld>

</xml_diff>

<commit_message>
Changed software outline PowerPoint
</commit_message>
<xml_diff>
--- a/financemanager_drawings.pptx
+++ b/financemanager_drawings.pptx
@@ -5,10 +5,9 @@
     <p:sldMasterId id="2147483648" r:id="rId1"/>
   </p:sldMasterIdLst>
   <p:sldIdLst>
-    <p:sldId id="256" r:id="rId2"/>
-    <p:sldId id="259" r:id="rId3"/>
-    <p:sldId id="257" r:id="rId4"/>
-    <p:sldId id="258" r:id="rId5"/>
+    <p:sldId id="259" r:id="rId2"/>
+    <p:sldId id="258" r:id="rId3"/>
+    <p:sldId id="260" r:id="rId4"/>
   </p:sldIdLst>
   <p:sldSz cx="12192000" cy="6858000"/>
   <p:notesSz cx="6858000" cy="9144000"/>
@@ -3331,10 +3330,10 @@
       </p:grpSpPr>
       <p:sp>
         <p:nvSpPr>
-          <p:cNvPr id="4" name="Titel 3">
-            <a:extLst>
-              <a:ext uri="{FF2B5EF4-FFF2-40B4-BE49-F238E27FC236}">
-                <a16:creationId xmlns:a16="http://schemas.microsoft.com/office/drawing/2014/main" id="{4D7870D9-7599-640B-A5ED-2958D6864081}"/>
+          <p:cNvPr id="2" name="Titel 1">
+            <a:extLst>
+              <a:ext uri="{FF2B5EF4-FFF2-40B4-BE49-F238E27FC236}">
+                <a16:creationId xmlns:a16="http://schemas.microsoft.com/office/drawing/2014/main" id="{A4E6B997-9961-FD63-EBEF-81786A3B4A70}"/>
               </a:ext>
             </a:extLst>
           </p:cNvPr>
@@ -3352,7 +3351,7 @@
           <a:p>
             <a:r>
               <a:rPr lang="de-DE" dirty="0" err="1"/>
-              <a:t>MainWindow</a:t>
+              <a:t>Requirements</a:t>
             </a:r>
             <a:endParaRPr lang="de-DE" dirty="0"/>
           </a:p>
@@ -3360,480 +3359,32 @@
       </p:sp>
       <p:sp>
         <p:nvSpPr>
-          <p:cNvPr id="5" name="Rechteck 4">
-            <a:extLst>
-              <a:ext uri="{FF2B5EF4-FFF2-40B4-BE49-F238E27FC236}">
-                <a16:creationId xmlns:a16="http://schemas.microsoft.com/office/drawing/2014/main" id="{A22ACC5D-E0D5-1DB9-26D9-4BEEDDD67928}"/>
-              </a:ext>
-            </a:extLst>
-          </p:cNvPr>
-          <p:cNvSpPr/>
-          <p:nvPr/>
-        </p:nvSpPr>
-        <p:spPr>
-          <a:xfrm>
-            <a:off x="2886075" y="1690688"/>
-            <a:ext cx="6572250" cy="4483100"/>
-          </a:xfrm>
-          <a:prstGeom prst="rect">
-            <a:avLst/>
-          </a:prstGeom>
-          <a:noFill/>
-          <a:ln w="28575">
-            <a:solidFill>
-              <a:schemeClr val="tx1"/>
-            </a:solidFill>
-          </a:ln>
-        </p:spPr>
-        <p:style>
-          <a:lnRef idx="2">
-            <a:schemeClr val="accent1">
-              <a:shade val="15000"/>
-            </a:schemeClr>
-          </a:lnRef>
-          <a:fillRef idx="1">
-            <a:schemeClr val="accent1"/>
-          </a:fillRef>
-          <a:effectRef idx="0">
-            <a:schemeClr val="accent1"/>
-          </a:effectRef>
-          <a:fontRef idx="minor">
-            <a:schemeClr val="lt1"/>
-          </a:fontRef>
-        </p:style>
-        <p:txBody>
-          <a:bodyPr rtlCol="0" anchor="ctr"/>
-          <a:lstStyle/>
-          <a:p>
-            <a:pPr algn="ctr"/>
-            <a:endParaRPr lang="de-DE" dirty="0"/>
-          </a:p>
-        </p:txBody>
-      </p:sp>
-      <p:sp>
-        <p:nvSpPr>
-          <p:cNvPr id="6" name="Rechteck 5">
-            <a:extLst>
-              <a:ext uri="{FF2B5EF4-FFF2-40B4-BE49-F238E27FC236}">
-                <a16:creationId xmlns:a16="http://schemas.microsoft.com/office/drawing/2014/main" id="{DBFA16C7-A03B-C897-9BD5-383F31854007}"/>
-              </a:ext>
-            </a:extLst>
-          </p:cNvPr>
-          <p:cNvSpPr/>
-          <p:nvPr/>
-        </p:nvSpPr>
-        <p:spPr>
-          <a:xfrm>
-            <a:off x="2886075" y="1490663"/>
-            <a:ext cx="6572250" cy="200026"/>
-          </a:xfrm>
-          <a:prstGeom prst="rect">
-            <a:avLst/>
-          </a:prstGeom>
-          <a:noFill/>
-          <a:ln w="28575">
-            <a:solidFill>
-              <a:schemeClr val="tx1"/>
-            </a:solidFill>
-          </a:ln>
-        </p:spPr>
-        <p:style>
-          <a:lnRef idx="2">
-            <a:schemeClr val="accent1">
-              <a:shade val="15000"/>
-            </a:schemeClr>
-          </a:lnRef>
-          <a:fillRef idx="1">
-            <a:schemeClr val="accent1"/>
-          </a:fillRef>
-          <a:effectRef idx="0">
-            <a:schemeClr val="accent1"/>
-          </a:effectRef>
-          <a:fontRef idx="minor">
-            <a:schemeClr val="lt1"/>
-          </a:fontRef>
-        </p:style>
-        <p:txBody>
-          <a:bodyPr rtlCol="0" anchor="ctr"/>
-          <a:lstStyle/>
-          <a:p>
-            <a:pPr algn="ctr"/>
-            <a:endParaRPr lang="de-DE"/>
-          </a:p>
-        </p:txBody>
-      </p:sp>
-      <p:sp>
-        <p:nvSpPr>
-          <p:cNvPr id="7" name="Rechteck 6">
-            <a:extLst>
-              <a:ext uri="{FF2B5EF4-FFF2-40B4-BE49-F238E27FC236}">
-                <a16:creationId xmlns:a16="http://schemas.microsoft.com/office/drawing/2014/main" id="{7F7DF118-2769-7FAB-605F-D7CE3B94B056}"/>
-              </a:ext>
-            </a:extLst>
-          </p:cNvPr>
-          <p:cNvSpPr/>
-          <p:nvPr/>
-        </p:nvSpPr>
-        <p:spPr>
-          <a:xfrm>
-            <a:off x="9258300" y="1490663"/>
-            <a:ext cx="200025" cy="200025"/>
-          </a:xfrm>
-          <a:prstGeom prst="rect">
-            <a:avLst/>
-          </a:prstGeom>
-          <a:noFill/>
-          <a:ln w="28575">
-            <a:solidFill>
-              <a:schemeClr val="tx1"/>
-            </a:solidFill>
-          </a:ln>
-        </p:spPr>
-        <p:style>
-          <a:lnRef idx="2">
-            <a:schemeClr val="accent1">
-              <a:shade val="15000"/>
-            </a:schemeClr>
-          </a:lnRef>
-          <a:fillRef idx="1">
-            <a:schemeClr val="accent1"/>
-          </a:fillRef>
-          <a:effectRef idx="0">
-            <a:schemeClr val="accent1"/>
-          </a:effectRef>
-          <a:fontRef idx="minor">
-            <a:schemeClr val="lt1"/>
-          </a:fontRef>
-        </p:style>
-        <p:txBody>
-          <a:bodyPr rtlCol="0" anchor="ctr"/>
-          <a:lstStyle/>
-          <a:p>
-            <a:pPr algn="ctr"/>
-            <a:endParaRPr lang="de-DE"/>
-          </a:p>
-        </p:txBody>
-      </p:sp>
-      <p:sp>
-        <p:nvSpPr>
-          <p:cNvPr id="8" name="Rechteck 7">
-            <a:extLst>
-              <a:ext uri="{FF2B5EF4-FFF2-40B4-BE49-F238E27FC236}">
-                <a16:creationId xmlns:a16="http://schemas.microsoft.com/office/drawing/2014/main" id="{CFF63333-186B-316A-D03B-CF1922D9D60C}"/>
-              </a:ext>
-            </a:extLst>
-          </p:cNvPr>
-          <p:cNvSpPr/>
-          <p:nvPr/>
-        </p:nvSpPr>
-        <p:spPr>
-          <a:xfrm>
-            <a:off x="9058275" y="1490662"/>
-            <a:ext cx="200025" cy="200025"/>
-          </a:xfrm>
-          <a:prstGeom prst="rect">
-            <a:avLst/>
-          </a:prstGeom>
-          <a:noFill/>
-          <a:ln w="28575">
-            <a:solidFill>
-              <a:schemeClr val="tx1"/>
-            </a:solidFill>
-          </a:ln>
-        </p:spPr>
-        <p:style>
-          <a:lnRef idx="2">
-            <a:schemeClr val="accent1">
-              <a:shade val="15000"/>
-            </a:schemeClr>
-          </a:lnRef>
-          <a:fillRef idx="1">
-            <a:schemeClr val="accent1"/>
-          </a:fillRef>
-          <a:effectRef idx="0">
-            <a:schemeClr val="accent1"/>
-          </a:effectRef>
-          <a:fontRef idx="minor">
-            <a:schemeClr val="lt1"/>
-          </a:fontRef>
-        </p:style>
-        <p:txBody>
-          <a:bodyPr rtlCol="0" anchor="ctr"/>
-          <a:lstStyle/>
-          <a:p>
-            <a:pPr algn="ctr"/>
-            <a:endParaRPr lang="de-DE"/>
-          </a:p>
-        </p:txBody>
-      </p:sp>
-      <p:sp>
-        <p:nvSpPr>
-          <p:cNvPr id="9" name="Rechteck 8">
-            <a:extLst>
-              <a:ext uri="{FF2B5EF4-FFF2-40B4-BE49-F238E27FC236}">
-                <a16:creationId xmlns:a16="http://schemas.microsoft.com/office/drawing/2014/main" id="{FA138DE1-58CB-97C4-4B70-0FBCBB1CAA38}"/>
-              </a:ext>
-            </a:extLst>
-          </p:cNvPr>
-          <p:cNvSpPr/>
-          <p:nvPr/>
-        </p:nvSpPr>
-        <p:spPr>
-          <a:xfrm>
-            <a:off x="8858250" y="1490663"/>
-            <a:ext cx="200025" cy="200025"/>
-          </a:xfrm>
-          <a:prstGeom prst="rect">
-            <a:avLst/>
-          </a:prstGeom>
-          <a:noFill/>
-          <a:ln w="28575">
-            <a:solidFill>
-              <a:schemeClr val="tx1"/>
-            </a:solidFill>
-          </a:ln>
-        </p:spPr>
-        <p:style>
-          <a:lnRef idx="2">
-            <a:schemeClr val="accent1">
-              <a:shade val="15000"/>
-            </a:schemeClr>
-          </a:lnRef>
-          <a:fillRef idx="1">
-            <a:schemeClr val="accent1"/>
-          </a:fillRef>
-          <a:effectRef idx="0">
-            <a:schemeClr val="accent1"/>
-          </a:effectRef>
-          <a:fontRef idx="minor">
-            <a:schemeClr val="lt1"/>
-          </a:fontRef>
-        </p:style>
-        <p:txBody>
-          <a:bodyPr rtlCol="0" anchor="ctr"/>
-          <a:lstStyle/>
-          <a:p>
-            <a:pPr algn="ctr"/>
-            <a:endParaRPr lang="de-DE"/>
-          </a:p>
-        </p:txBody>
-      </p:sp>
-      <p:sp>
-        <p:nvSpPr>
-          <p:cNvPr id="10" name="Textfeld 9">
-            <a:extLst>
-              <a:ext uri="{FF2B5EF4-FFF2-40B4-BE49-F238E27FC236}">
-                <a16:creationId xmlns:a16="http://schemas.microsoft.com/office/drawing/2014/main" id="{A5C95E44-8CBC-7925-7AE3-E63974579D65}"/>
-              </a:ext>
-            </a:extLst>
-          </p:cNvPr>
-          <p:cNvSpPr txBox="1"/>
-          <p:nvPr/>
-        </p:nvSpPr>
-        <p:spPr>
-          <a:xfrm>
-            <a:off x="9234487" y="1384575"/>
-            <a:ext cx="728663" cy="369332"/>
-          </a:xfrm>
-          <a:prstGeom prst="rect">
-            <a:avLst/>
-          </a:prstGeom>
-          <a:noFill/>
-        </p:spPr>
-        <p:txBody>
-          <a:bodyPr wrap="square" rtlCol="0">
-            <a:spAutoFit/>
-          </a:bodyPr>
+          <p:cNvPr id="3" name="Inhaltsplatzhalter 2">
+            <a:extLst>
+              <a:ext uri="{FF2B5EF4-FFF2-40B4-BE49-F238E27FC236}">
+                <a16:creationId xmlns:a16="http://schemas.microsoft.com/office/drawing/2014/main" id="{4BA39C15-A8AA-B965-97E2-92AD4E12C6CC}"/>
+              </a:ext>
+            </a:extLst>
+          </p:cNvPr>
+          <p:cNvSpPr>
+            <a:spLocks noGrp="1"/>
+          </p:cNvSpPr>
+          <p:nvPr>
+            <p:ph idx="1"/>
+          </p:nvPr>
+        </p:nvSpPr>
+        <p:spPr/>
+        <p:txBody>
+          <a:bodyPr/>
           <a:lstStyle/>
           <a:p>
             <a:r>
               <a:rPr lang="de-DE" dirty="0"/>
-              <a:t>x</a:t>
-            </a:r>
-          </a:p>
-        </p:txBody>
-      </p:sp>
-      <p:sp>
-        <p:nvSpPr>
-          <p:cNvPr id="11" name="Textfeld 10">
-            <a:extLst>
-              <a:ext uri="{FF2B5EF4-FFF2-40B4-BE49-F238E27FC236}">
-                <a16:creationId xmlns:a16="http://schemas.microsoft.com/office/drawing/2014/main" id="{1FF8AC6C-66E7-1634-F0DC-050DF2DF948A}"/>
-              </a:ext>
-            </a:extLst>
-          </p:cNvPr>
-          <p:cNvSpPr txBox="1"/>
-          <p:nvPr/>
-        </p:nvSpPr>
-        <p:spPr>
-          <a:xfrm>
-            <a:off x="8872537" y="1356003"/>
-            <a:ext cx="61913" cy="369332"/>
-          </a:xfrm>
-          <a:prstGeom prst="rect">
-            <a:avLst/>
-          </a:prstGeom>
-          <a:noFill/>
-        </p:spPr>
-        <p:txBody>
-          <a:bodyPr wrap="square" rtlCol="0">
-            <a:spAutoFit/>
-          </a:bodyPr>
-          <a:lstStyle/>
-          <a:p>
-            <a:r>
-              <a:rPr lang="de-DE" dirty="0"/>
-              <a:t>_</a:t>
-            </a:r>
-          </a:p>
-        </p:txBody>
-      </p:sp>
-      <p:sp>
-        <p:nvSpPr>
-          <p:cNvPr id="12" name="Rechteck 11">
-            <a:extLst>
-              <a:ext uri="{FF2B5EF4-FFF2-40B4-BE49-F238E27FC236}">
-                <a16:creationId xmlns:a16="http://schemas.microsoft.com/office/drawing/2014/main" id="{A0614997-844E-57E2-A3DE-7B09B7358E79}"/>
-              </a:ext>
-            </a:extLst>
-          </p:cNvPr>
-          <p:cNvSpPr/>
-          <p:nvPr/>
-        </p:nvSpPr>
-        <p:spPr>
-          <a:xfrm>
-            <a:off x="9103518" y="1541745"/>
-            <a:ext cx="85725" cy="85725"/>
-          </a:xfrm>
-          <a:prstGeom prst="rect">
-            <a:avLst/>
-          </a:prstGeom>
-          <a:noFill/>
-          <a:ln w="12700">
-            <a:solidFill>
-              <a:schemeClr val="tx1"/>
-            </a:solidFill>
-          </a:ln>
-        </p:spPr>
-        <p:style>
-          <a:lnRef idx="2">
-            <a:schemeClr val="accent1">
-              <a:shade val="15000"/>
-            </a:schemeClr>
-          </a:lnRef>
-          <a:fillRef idx="1">
-            <a:schemeClr val="accent1"/>
-          </a:fillRef>
-          <a:effectRef idx="0">
-            <a:schemeClr val="accent1"/>
-          </a:effectRef>
-          <a:fontRef idx="minor">
-            <a:schemeClr val="lt1"/>
-          </a:fontRef>
-        </p:style>
-        <p:txBody>
-          <a:bodyPr rtlCol="0" anchor="ctr"/>
-          <a:lstStyle/>
-          <a:p>
-            <a:pPr algn="ctr"/>
-            <a:endParaRPr lang="de-DE"/>
-          </a:p>
-        </p:txBody>
-      </p:sp>
-      <p:sp>
-        <p:nvSpPr>
-          <p:cNvPr id="13" name="Rechteck 12">
-            <a:extLst>
-              <a:ext uri="{FF2B5EF4-FFF2-40B4-BE49-F238E27FC236}">
-                <a16:creationId xmlns:a16="http://schemas.microsoft.com/office/drawing/2014/main" id="{50C5B167-DA89-38E6-CFD6-AC17E38F4792}"/>
-              </a:ext>
-            </a:extLst>
-          </p:cNvPr>
-          <p:cNvSpPr/>
-          <p:nvPr/>
-        </p:nvSpPr>
-        <p:spPr>
-          <a:xfrm>
-            <a:off x="3093720" y="2015847"/>
-            <a:ext cx="3665220" cy="3828694"/>
-          </a:xfrm>
-          <a:prstGeom prst="rect">
-            <a:avLst/>
-          </a:prstGeom>
-          <a:noFill/>
-          <a:ln>
-            <a:solidFill>
-              <a:schemeClr val="tx1"/>
-            </a:solidFill>
-          </a:ln>
-        </p:spPr>
-        <p:style>
-          <a:lnRef idx="2">
-            <a:schemeClr val="accent1">
-              <a:shade val="15000"/>
-            </a:schemeClr>
-          </a:lnRef>
-          <a:fillRef idx="1">
-            <a:schemeClr val="accent1"/>
-          </a:fillRef>
-          <a:effectRef idx="0">
-            <a:schemeClr val="accent1"/>
-          </a:effectRef>
-          <a:fontRef idx="minor">
-            <a:schemeClr val="lt1"/>
-          </a:fontRef>
-        </p:style>
-        <p:txBody>
-          <a:bodyPr rtlCol="0" anchor="ctr"/>
-          <a:lstStyle/>
-          <a:p>
-            <a:pPr algn="ctr"/>
-            <a:endParaRPr lang="de-DE"/>
-          </a:p>
-        </p:txBody>
-      </p:sp>
-      <p:sp>
-        <p:nvSpPr>
-          <p:cNvPr id="15" name="Textfeld 14">
-            <a:extLst>
-              <a:ext uri="{FF2B5EF4-FFF2-40B4-BE49-F238E27FC236}">
-                <a16:creationId xmlns:a16="http://schemas.microsoft.com/office/drawing/2014/main" id="{97C3646A-5C81-EE94-B18B-B8EF425AA77E}"/>
-              </a:ext>
-            </a:extLst>
-          </p:cNvPr>
-          <p:cNvSpPr txBox="1"/>
-          <p:nvPr/>
-        </p:nvSpPr>
-        <p:spPr>
-          <a:xfrm>
-            <a:off x="3093720" y="1997445"/>
-            <a:ext cx="3665220" cy="923330"/>
-          </a:xfrm>
-          <a:prstGeom prst="rect">
-            <a:avLst/>
-          </a:prstGeom>
-          <a:noFill/>
-        </p:spPr>
-        <p:txBody>
-          <a:bodyPr wrap="square" rtlCol="0">
-            <a:spAutoFit/>
-          </a:bodyPr>
-          <a:lstStyle/>
-          <a:p>
+              <a:t>Analysis </a:t>
+            </a:r>
             <a:r>
               <a:rPr lang="de-DE" dirty="0" err="1"/>
-              <a:t>ListBox</a:t>
-            </a:r>
-            <a:endParaRPr lang="de-DE" dirty="0"/>
-          </a:p>
-          <a:p>
-            <a:pPr marL="285750" indent="-285750">
-              <a:buFontTx/>
-              <a:buChar char="-"/>
-            </a:pPr>
-            <a:r>
-              <a:rPr lang="de-DE" dirty="0" err="1"/>
-              <a:t>Contains</a:t>
+              <a:t>of</a:t>
             </a:r>
             <a:r>
               <a:rPr lang="de-DE" dirty="0"/>
@@ -3841,7 +3392,7 @@
             </a:r>
             <a:r>
               <a:rPr lang="de-DE" dirty="0" err="1"/>
-              <a:t>items</a:t>
+              <a:t>bilance</a:t>
             </a:r>
             <a:r>
               <a:rPr lang="de-DE" dirty="0"/>
@@ -3849,7 +3400,22 @@
             </a:r>
             <a:r>
               <a:rPr lang="de-DE" dirty="0" err="1"/>
-              <a:t>that</a:t>
+              <a:t>for</a:t>
+            </a:r>
+            <a:r>
+              <a:rPr lang="de-DE" dirty="0"/>
+              <a:t> private </a:t>
+            </a:r>
+            <a:r>
+              <a:rPr lang="de-DE" dirty="0" err="1"/>
+              <a:t>households</a:t>
+            </a:r>
+            <a:endParaRPr lang="de-DE" dirty="0"/>
+          </a:p>
+          <a:p>
+            <a:r>
+              <a:rPr lang="de-DE" dirty="0" err="1"/>
+              <a:t>Give</a:t>
             </a:r>
             <a:r>
               <a:rPr lang="de-DE" dirty="0"/>
@@ -3857,7 +3423,7 @@
             </a:r>
             <a:r>
               <a:rPr lang="de-DE" dirty="0" err="1"/>
-              <a:t>contain</a:t>
+              <a:t>overview</a:t>
             </a:r>
             <a:r>
               <a:rPr lang="de-DE" dirty="0"/>
@@ -3865,7 +3431,7 @@
             </a:r>
             <a:r>
               <a:rPr lang="de-DE" dirty="0" err="1"/>
-              <a:t>the</a:t>
+              <a:t>of</a:t>
             </a:r>
             <a:r>
               <a:rPr lang="de-DE" dirty="0"/>
@@ -3873,643 +3439,167 @@
             </a:r>
             <a:r>
               <a:rPr lang="de-DE" dirty="0" err="1"/>
-              <a:t>year</a:t>
+              <a:t>bilance</a:t>
+            </a:r>
+            <a:r>
+              <a:rPr lang="de-DE" dirty="0"/>
+              <a:t> </a:t>
+            </a:r>
+          </a:p>
+          <a:p>
+            <a:r>
+              <a:rPr lang="de-DE" dirty="0" err="1"/>
+              <a:t>Offer</a:t>
+            </a:r>
+            <a:r>
+              <a:rPr lang="de-DE" dirty="0"/>
+              <a:t> </a:t>
+            </a:r>
+            <a:r>
+              <a:rPr lang="de-DE" dirty="0" err="1"/>
+              <a:t>tools</a:t>
+            </a:r>
+            <a:r>
+              <a:rPr lang="de-DE" dirty="0"/>
+              <a:t> </a:t>
+            </a:r>
+            <a:r>
+              <a:rPr lang="de-DE" dirty="0" err="1"/>
+              <a:t>for</a:t>
+            </a:r>
+            <a:r>
+              <a:rPr lang="de-DE" dirty="0"/>
+              <a:t> </a:t>
+            </a:r>
+            <a:r>
+              <a:rPr lang="de-DE" dirty="0" err="1"/>
+              <a:t>bilance</a:t>
+            </a:r>
+            <a:r>
+              <a:rPr lang="de-DE" dirty="0"/>
+              <a:t> </a:t>
+            </a:r>
+            <a:r>
+              <a:rPr lang="de-DE" dirty="0" err="1"/>
+              <a:t>analysis</a:t>
             </a:r>
             <a:endParaRPr lang="de-DE" dirty="0"/>
           </a:p>
           <a:p>
-            <a:pPr marL="285750" indent="-285750">
-              <a:buFontTx/>
-              <a:buChar char="-"/>
+            <a:pPr lvl="1"/>
+            <a:r>
+              <a:rPr lang="de-DE" dirty="0" err="1"/>
+              <a:t>Characterization</a:t>
+            </a:r>
+            <a:r>
+              <a:rPr lang="de-DE" dirty="0"/>
+              <a:t> </a:t>
+            </a:r>
+            <a:r>
+              <a:rPr lang="de-DE" dirty="0" err="1"/>
+              <a:t>of</a:t>
+            </a:r>
+            <a:r>
+              <a:rPr lang="de-DE" dirty="0"/>
+              <a:t> </a:t>
+            </a:r>
+            <a:r>
+              <a:rPr lang="de-DE" dirty="0" err="1"/>
+              <a:t>transactions</a:t>
+            </a:r>
+            <a:endParaRPr lang="de-DE" dirty="0"/>
+          </a:p>
+          <a:p>
+            <a:pPr lvl="1"/>
+            <a:r>
+              <a:rPr lang="de-DE" dirty="0" err="1"/>
+              <a:t>Graphical</a:t>
+            </a:r>
+            <a:r>
+              <a:rPr lang="de-DE" dirty="0"/>
+              <a:t> </a:t>
+            </a:r>
+            <a:r>
+              <a:rPr lang="de-DE" dirty="0" err="1"/>
+              <a:t>representation</a:t>
+            </a:r>
+            <a:r>
+              <a:rPr lang="de-DE" dirty="0"/>
+              <a:t> </a:t>
+            </a:r>
+            <a:r>
+              <a:rPr lang="de-DE" dirty="0" err="1"/>
+              <a:t>of</a:t>
+            </a:r>
+            <a:r>
+              <a:rPr lang="de-DE" dirty="0"/>
+              <a:t> </a:t>
+            </a:r>
+            <a:r>
+              <a:rPr lang="de-DE" dirty="0" err="1"/>
+              <a:t>bilance</a:t>
+            </a:r>
+            <a:endParaRPr lang="de-DE" dirty="0"/>
+          </a:p>
+          <a:p>
+            <a:pPr lvl="1"/>
+            <a:r>
+              <a:rPr lang="de-DE" dirty="0" err="1"/>
+              <a:t>Amount</a:t>
+            </a:r>
+            <a:r>
+              <a:rPr lang="de-DE" dirty="0"/>
+              <a:t> </a:t>
+            </a:r>
+            <a:r>
+              <a:rPr lang="de-DE" dirty="0" err="1"/>
+              <a:t>to</a:t>
+            </a:r>
+            <a:r>
+              <a:rPr lang="de-DE" dirty="0"/>
+              <a:t> </a:t>
+            </a:r>
+            <a:r>
+              <a:rPr lang="de-DE" dirty="0" err="1"/>
+              <a:t>spend</a:t>
+            </a:r>
+            <a:r>
+              <a:rPr lang="de-DE" dirty="0"/>
+              <a:t> </a:t>
+            </a:r>
+            <a:r>
+              <a:rPr lang="de-DE" dirty="0" err="1"/>
+              <a:t>freely</a:t>
+            </a:r>
+            <a:r>
+              <a:rPr lang="de-DE" dirty="0"/>
+              <a:t> </a:t>
+            </a:r>
+          </a:p>
+          <a:p>
+            <a:r>
+              <a:rPr lang="de-DE" dirty="0"/>
+              <a:t>Store </a:t>
+            </a:r>
+            <a:r>
+              <a:rPr lang="de-DE" dirty="0" err="1"/>
+              <a:t>bilances</a:t>
+            </a:r>
+            <a:r>
+              <a:rPr lang="de-DE" dirty="0"/>
+              <a:t> in </a:t>
+            </a:r>
+            <a:r>
+              <a:rPr lang="de-DE" dirty="0" err="1"/>
+              <a:t>database</a:t>
+            </a:r>
+            <a:endParaRPr lang="de-DE" dirty="0"/>
+          </a:p>
+          <a:p>
+            <a:pPr marL="0" indent="0">
+              <a:buNone/>
             </a:pPr>
             <a:endParaRPr lang="de-DE" dirty="0"/>
-          </a:p>
-        </p:txBody>
-      </p:sp>
-      <p:grpSp>
-        <p:nvGrpSpPr>
-          <p:cNvPr id="21" name="Gruppieren 20">
-            <a:extLst>
-              <a:ext uri="{FF2B5EF4-FFF2-40B4-BE49-F238E27FC236}">
-                <a16:creationId xmlns:a16="http://schemas.microsoft.com/office/drawing/2014/main" id="{69B9F6F9-E9EC-7C01-9D42-348AD8C7AD7C}"/>
-              </a:ext>
-            </a:extLst>
-          </p:cNvPr>
-          <p:cNvGrpSpPr/>
-          <p:nvPr/>
-        </p:nvGrpSpPr>
-        <p:grpSpPr>
-          <a:xfrm>
-            <a:off x="6918007" y="2015846"/>
-            <a:ext cx="2316480" cy="1135380"/>
-            <a:chOff x="6941820" y="1912620"/>
-            <a:chExt cx="2316480" cy="1135380"/>
-          </a:xfrm>
-        </p:grpSpPr>
-        <p:sp>
-          <p:nvSpPr>
-            <p:cNvPr id="14" name="Rechteck 13">
-              <a:extLst>
-                <a:ext uri="{FF2B5EF4-FFF2-40B4-BE49-F238E27FC236}">
-                  <a16:creationId xmlns:a16="http://schemas.microsoft.com/office/drawing/2014/main" id="{906C4300-1997-9885-D6B7-B51EA3E14EEB}"/>
-                </a:ext>
-              </a:extLst>
-            </p:cNvPr>
-            <p:cNvSpPr/>
-            <p:nvPr/>
-          </p:nvSpPr>
-          <p:spPr>
-            <a:xfrm>
-              <a:off x="6941820" y="1912620"/>
-              <a:ext cx="2316480" cy="1135380"/>
-            </a:xfrm>
-            <a:prstGeom prst="rect">
-              <a:avLst/>
-            </a:prstGeom>
-            <a:noFill/>
-            <a:ln>
-              <a:solidFill>
-                <a:schemeClr val="tx1"/>
-              </a:solidFill>
-              <a:prstDash val="dash"/>
-            </a:ln>
-          </p:spPr>
-          <p:style>
-            <a:lnRef idx="2">
-              <a:schemeClr val="accent1">
-                <a:shade val="15000"/>
-              </a:schemeClr>
-            </a:lnRef>
-            <a:fillRef idx="1">
-              <a:schemeClr val="accent1"/>
-            </a:fillRef>
-            <a:effectRef idx="0">
-              <a:schemeClr val="accent1"/>
-            </a:effectRef>
-            <a:fontRef idx="minor">
-              <a:schemeClr val="lt1"/>
-            </a:fontRef>
-          </p:style>
-          <p:txBody>
-            <a:bodyPr rtlCol="0" anchor="ctr"/>
-            <a:lstStyle/>
-            <a:p>
-              <a:pPr algn="ctr"/>
-              <a:endParaRPr lang="de-DE"/>
-            </a:p>
-          </p:txBody>
-        </p:sp>
-        <p:sp>
-          <p:nvSpPr>
-            <p:cNvPr id="16" name="Rechteck 15">
-              <a:extLst>
-                <a:ext uri="{FF2B5EF4-FFF2-40B4-BE49-F238E27FC236}">
-                  <a16:creationId xmlns:a16="http://schemas.microsoft.com/office/drawing/2014/main" id="{6D24A163-1B39-F37C-DA0A-F9D363F14F22}"/>
-                </a:ext>
-              </a:extLst>
-            </p:cNvPr>
-            <p:cNvSpPr/>
-            <p:nvPr/>
-          </p:nvSpPr>
-          <p:spPr>
-            <a:xfrm>
-              <a:off x="7025641" y="2015846"/>
-              <a:ext cx="2163602" cy="251460"/>
-            </a:xfrm>
-            <a:prstGeom prst="rect">
-              <a:avLst/>
-            </a:prstGeom>
-            <a:solidFill>
-              <a:schemeClr val="bg2">
-                <a:lumMod val="75000"/>
-              </a:schemeClr>
-            </a:solidFill>
-            <a:ln>
-              <a:solidFill>
-                <a:schemeClr val="tx1"/>
-              </a:solidFill>
-            </a:ln>
-          </p:spPr>
-          <p:style>
-            <a:lnRef idx="2">
-              <a:schemeClr val="accent1">
-                <a:shade val="15000"/>
-              </a:schemeClr>
-            </a:lnRef>
-            <a:fillRef idx="1">
-              <a:schemeClr val="accent1"/>
-            </a:fillRef>
-            <a:effectRef idx="0">
-              <a:schemeClr val="accent1"/>
-            </a:effectRef>
-            <a:fontRef idx="minor">
-              <a:schemeClr val="lt1"/>
-            </a:fontRef>
-          </p:style>
-          <p:txBody>
-            <a:bodyPr rtlCol="0" anchor="ctr"/>
-            <a:lstStyle/>
-            <a:p>
-              <a:pPr algn="ctr"/>
-              <a:r>
-                <a:rPr lang="de-DE" dirty="0"/>
-                <a:t>Add Year</a:t>
-              </a:r>
-            </a:p>
-          </p:txBody>
-        </p:sp>
-        <p:sp>
-          <p:nvSpPr>
-            <p:cNvPr id="17" name="Rechteck 16">
-              <a:extLst>
-                <a:ext uri="{FF2B5EF4-FFF2-40B4-BE49-F238E27FC236}">
-                  <a16:creationId xmlns:a16="http://schemas.microsoft.com/office/drawing/2014/main" id="{C026EF41-5428-BBB4-070E-B9807CD63683}"/>
-                </a:ext>
-              </a:extLst>
-            </p:cNvPr>
-            <p:cNvSpPr/>
-            <p:nvPr/>
-          </p:nvSpPr>
-          <p:spPr>
-            <a:xfrm>
-              <a:off x="7025641" y="2363507"/>
-              <a:ext cx="2163602" cy="251460"/>
-            </a:xfrm>
-            <a:prstGeom prst="rect">
-              <a:avLst/>
-            </a:prstGeom>
-            <a:solidFill>
-              <a:schemeClr val="bg2">
-                <a:lumMod val="75000"/>
-              </a:schemeClr>
-            </a:solidFill>
-            <a:ln>
-              <a:solidFill>
-                <a:schemeClr val="tx1"/>
-              </a:solidFill>
-            </a:ln>
-          </p:spPr>
-          <p:style>
-            <a:lnRef idx="2">
-              <a:schemeClr val="accent1">
-                <a:shade val="15000"/>
-              </a:schemeClr>
-            </a:lnRef>
-            <a:fillRef idx="1">
-              <a:schemeClr val="accent1"/>
-            </a:fillRef>
-            <a:effectRef idx="0">
-              <a:schemeClr val="accent1"/>
-            </a:effectRef>
-            <a:fontRef idx="minor">
-              <a:schemeClr val="lt1"/>
-            </a:fontRef>
-          </p:style>
-          <p:txBody>
-            <a:bodyPr rtlCol="0" anchor="ctr"/>
-            <a:lstStyle/>
-            <a:p>
-              <a:pPr algn="ctr"/>
-              <a:r>
-                <a:rPr lang="de-DE" dirty="0"/>
-                <a:t>Remove Year</a:t>
-              </a:r>
-            </a:p>
-          </p:txBody>
-        </p:sp>
-        <p:sp>
-          <p:nvSpPr>
-            <p:cNvPr id="18" name="Rechteck 17">
-              <a:extLst>
-                <a:ext uri="{FF2B5EF4-FFF2-40B4-BE49-F238E27FC236}">
-                  <a16:creationId xmlns:a16="http://schemas.microsoft.com/office/drawing/2014/main" id="{EA8F59C6-7AC0-8A45-8D60-8EB7A35F1A40}"/>
-                </a:ext>
-              </a:extLst>
-            </p:cNvPr>
-            <p:cNvSpPr/>
-            <p:nvPr/>
-          </p:nvSpPr>
-          <p:spPr>
-            <a:xfrm>
-              <a:off x="7025641" y="2691819"/>
-              <a:ext cx="2163602" cy="251460"/>
-            </a:xfrm>
-            <a:prstGeom prst="rect">
-              <a:avLst/>
-            </a:prstGeom>
-            <a:solidFill>
-              <a:schemeClr val="bg2">
-                <a:lumMod val="75000"/>
-              </a:schemeClr>
-            </a:solidFill>
-            <a:ln>
-              <a:solidFill>
-                <a:schemeClr val="tx1"/>
-              </a:solidFill>
-            </a:ln>
-          </p:spPr>
-          <p:style>
-            <a:lnRef idx="2">
-              <a:schemeClr val="accent1">
-                <a:shade val="15000"/>
-              </a:schemeClr>
-            </a:lnRef>
-            <a:fillRef idx="1">
-              <a:schemeClr val="accent1"/>
-            </a:fillRef>
-            <a:effectRef idx="0">
-              <a:schemeClr val="accent1"/>
-            </a:effectRef>
-            <a:fontRef idx="minor">
-              <a:schemeClr val="lt1"/>
-            </a:fontRef>
-          </p:style>
-          <p:txBody>
-            <a:bodyPr rtlCol="0" anchor="ctr"/>
-            <a:lstStyle/>
-            <a:p>
-              <a:pPr algn="ctr"/>
-              <a:r>
-                <a:rPr lang="de-DE" dirty="0"/>
-                <a:t>Edit Year</a:t>
-              </a:r>
-            </a:p>
-          </p:txBody>
-        </p:sp>
-      </p:grpSp>
-      <p:sp>
-        <p:nvSpPr>
-          <p:cNvPr id="22" name="Textfeld 21">
-            <a:extLst>
-              <a:ext uri="{FF2B5EF4-FFF2-40B4-BE49-F238E27FC236}">
-                <a16:creationId xmlns:a16="http://schemas.microsoft.com/office/drawing/2014/main" id="{A093CFBC-7A29-781E-44A5-AC179A7F782A}"/>
-              </a:ext>
-            </a:extLst>
-          </p:cNvPr>
-          <p:cNvSpPr txBox="1"/>
-          <p:nvPr/>
-        </p:nvSpPr>
-        <p:spPr>
-          <a:xfrm>
-            <a:off x="2924651" y="1658276"/>
-            <a:ext cx="2954655" cy="276999"/>
-          </a:xfrm>
-          <a:prstGeom prst="rect">
-            <a:avLst/>
-          </a:prstGeom>
-          <a:noFill/>
-        </p:spPr>
-        <p:txBody>
-          <a:bodyPr wrap="none" rtlCol="0">
-            <a:spAutoFit/>
-          </a:bodyPr>
-          <a:lstStyle/>
-          <a:p>
-            <a:r>
-              <a:rPr lang="de-DE" sz="1200" b="1" dirty="0"/>
-              <a:t>File	Edit	…	</a:t>
-            </a:r>
-          </a:p>
-        </p:txBody>
-      </p:sp>
-      <p:sp>
-        <p:nvSpPr>
-          <p:cNvPr id="23" name="Textfeld 22">
-            <a:extLst>
-              <a:ext uri="{FF2B5EF4-FFF2-40B4-BE49-F238E27FC236}">
-                <a16:creationId xmlns:a16="http://schemas.microsoft.com/office/drawing/2014/main" id="{FBFC282D-3E56-1A67-69B2-1A57D2A28DC9}"/>
-              </a:ext>
-            </a:extLst>
-          </p:cNvPr>
-          <p:cNvSpPr txBox="1"/>
-          <p:nvPr/>
-        </p:nvSpPr>
-        <p:spPr>
-          <a:xfrm>
-            <a:off x="2914689" y="1446791"/>
-            <a:ext cx="1284262" cy="276999"/>
-          </a:xfrm>
-          <a:prstGeom prst="rect">
-            <a:avLst/>
-          </a:prstGeom>
-          <a:noFill/>
-        </p:spPr>
-        <p:txBody>
-          <a:bodyPr wrap="none" rtlCol="0">
-            <a:spAutoFit/>
-          </a:bodyPr>
-          <a:lstStyle/>
-          <a:p>
-            <a:r>
-              <a:rPr lang="de-DE" sz="1200" b="1" dirty="0"/>
-              <a:t>Finance Manager</a:t>
-            </a:r>
-          </a:p>
-        </p:txBody>
-      </p:sp>
-      <p:sp>
-        <p:nvSpPr>
-          <p:cNvPr id="25" name="Rechteck 24">
-            <a:extLst>
-              <a:ext uri="{FF2B5EF4-FFF2-40B4-BE49-F238E27FC236}">
-                <a16:creationId xmlns:a16="http://schemas.microsoft.com/office/drawing/2014/main" id="{C58577DA-9BC8-3E01-09DC-500CE770949E}"/>
-              </a:ext>
-            </a:extLst>
-          </p:cNvPr>
-          <p:cNvSpPr/>
-          <p:nvPr/>
-        </p:nvSpPr>
-        <p:spPr>
-          <a:xfrm>
-            <a:off x="2886075" y="5989320"/>
-            <a:ext cx="6572250" cy="184468"/>
-          </a:xfrm>
-          <a:prstGeom prst="rect">
-            <a:avLst/>
-          </a:prstGeom>
-          <a:noFill/>
-          <a:ln w="28575">
-            <a:solidFill>
-              <a:schemeClr val="tx1"/>
-            </a:solidFill>
-          </a:ln>
-        </p:spPr>
-        <p:style>
-          <a:lnRef idx="2">
-            <a:schemeClr val="accent1">
-              <a:shade val="15000"/>
-            </a:schemeClr>
-          </a:lnRef>
-          <a:fillRef idx="1">
-            <a:schemeClr val="accent1"/>
-          </a:fillRef>
-          <a:effectRef idx="0">
-            <a:schemeClr val="accent1"/>
-          </a:effectRef>
-          <a:fontRef idx="minor">
-            <a:schemeClr val="lt1"/>
-          </a:fontRef>
-        </p:style>
-        <p:txBody>
-          <a:bodyPr rtlCol="0" anchor="ctr"/>
-          <a:lstStyle/>
-          <a:p>
-            <a:r>
-              <a:rPr lang="de-DE" sz="1200" b="1" dirty="0">
-                <a:solidFill>
-                  <a:schemeClr val="tx1"/>
-                </a:solidFill>
-              </a:rPr>
-              <a:t>Status Bar</a:t>
-            </a:r>
-          </a:p>
-        </p:txBody>
-      </p:sp>
-    </p:spTree>
-    <p:extLst>
-      <p:ext uri="{BB962C8B-B14F-4D97-AF65-F5344CB8AC3E}">
-        <p14:creationId xmlns:p14="http://schemas.microsoft.com/office/powerpoint/2010/main" val="2305725408"/>
-      </p:ext>
-    </p:extLst>
-  </p:cSld>
-  <p:clrMapOvr>
-    <a:masterClrMapping/>
-  </p:clrMapOvr>
-</p:sld>
-</file>
-
-<file path=ppt/slides/slide2.xml><?xml version="1.0" encoding="utf-8"?>
-<p:sld xmlns:a="http://schemas.openxmlformats.org/drawingml/2006/main" xmlns:r="http://schemas.openxmlformats.org/officeDocument/2006/relationships" xmlns:p="http://schemas.openxmlformats.org/presentationml/2006/main">
-  <p:cSld>
-    <p:spTree>
-      <p:nvGrpSpPr>
-        <p:cNvPr id="1" name=""/>
-        <p:cNvGrpSpPr/>
-        <p:nvPr/>
-      </p:nvGrpSpPr>
-      <p:grpSpPr>
-        <a:xfrm>
-          <a:off x="0" y="0"/>
-          <a:ext cx="0" cy="0"/>
-          <a:chOff x="0" y="0"/>
-          <a:chExt cx="0" cy="0"/>
-        </a:xfrm>
-      </p:grpSpPr>
-      <p:sp>
-        <p:nvSpPr>
-          <p:cNvPr id="2" name="Titel 1">
-            <a:extLst>
-              <a:ext uri="{FF2B5EF4-FFF2-40B4-BE49-F238E27FC236}">
-                <a16:creationId xmlns:a16="http://schemas.microsoft.com/office/drawing/2014/main" id="{A4E6B997-9961-FD63-EBEF-81786A3B4A70}"/>
-              </a:ext>
-            </a:extLst>
-          </p:cNvPr>
-          <p:cNvSpPr>
-            <a:spLocks noGrp="1"/>
-          </p:cNvSpPr>
-          <p:nvPr>
-            <p:ph type="title"/>
-          </p:nvPr>
-        </p:nvSpPr>
-        <p:spPr/>
-        <p:txBody>
-          <a:bodyPr/>
-          <a:lstStyle/>
-          <a:p>
-            <a:r>
-              <a:rPr lang="de-DE" dirty="0" err="1"/>
-              <a:t>Requirements</a:t>
-            </a:r>
-            <a:endParaRPr lang="de-DE" dirty="0"/>
-          </a:p>
-        </p:txBody>
-      </p:sp>
-      <p:sp>
-        <p:nvSpPr>
-          <p:cNvPr id="3" name="Inhaltsplatzhalter 2">
-            <a:extLst>
-              <a:ext uri="{FF2B5EF4-FFF2-40B4-BE49-F238E27FC236}">
-                <a16:creationId xmlns:a16="http://schemas.microsoft.com/office/drawing/2014/main" id="{4BA39C15-A8AA-B965-97E2-92AD4E12C6CC}"/>
-              </a:ext>
-            </a:extLst>
-          </p:cNvPr>
-          <p:cNvSpPr>
-            <a:spLocks noGrp="1"/>
-          </p:cNvSpPr>
-          <p:nvPr>
-            <p:ph idx="1"/>
-          </p:nvPr>
-        </p:nvSpPr>
-        <p:spPr/>
-        <p:txBody>
-          <a:bodyPr/>
-          <a:lstStyle/>
-          <a:p>
-            <a:r>
-              <a:rPr lang="de-DE" dirty="0"/>
-              <a:t>Analysis </a:t>
-            </a:r>
-            <a:r>
-              <a:rPr lang="de-DE" dirty="0" err="1"/>
-              <a:t>of</a:t>
-            </a:r>
-            <a:r>
-              <a:rPr lang="de-DE" dirty="0"/>
-              <a:t> </a:t>
-            </a:r>
-            <a:r>
-              <a:rPr lang="de-DE" dirty="0" err="1"/>
-              <a:t>bilance</a:t>
-            </a:r>
-            <a:r>
-              <a:rPr lang="de-DE" dirty="0"/>
-              <a:t> </a:t>
-            </a:r>
-            <a:r>
-              <a:rPr lang="de-DE" dirty="0" err="1"/>
-              <a:t>for</a:t>
-            </a:r>
-            <a:r>
-              <a:rPr lang="de-DE" dirty="0"/>
-              <a:t> private </a:t>
-            </a:r>
-            <a:r>
-              <a:rPr lang="de-DE" dirty="0" err="1"/>
-              <a:t>households</a:t>
-            </a:r>
-            <a:endParaRPr lang="de-DE" dirty="0"/>
-          </a:p>
-          <a:p>
-            <a:r>
-              <a:rPr lang="de-DE" dirty="0" err="1"/>
-              <a:t>Give</a:t>
-            </a:r>
-            <a:r>
-              <a:rPr lang="de-DE" dirty="0"/>
-              <a:t> </a:t>
-            </a:r>
-            <a:r>
-              <a:rPr lang="de-DE" dirty="0" err="1"/>
-              <a:t>overview</a:t>
-            </a:r>
-            <a:r>
-              <a:rPr lang="de-DE" dirty="0"/>
-              <a:t> </a:t>
-            </a:r>
-            <a:r>
-              <a:rPr lang="de-DE" dirty="0" err="1"/>
-              <a:t>of</a:t>
-            </a:r>
-            <a:r>
-              <a:rPr lang="de-DE" dirty="0"/>
-              <a:t> </a:t>
-            </a:r>
-            <a:r>
-              <a:rPr lang="de-DE" dirty="0" err="1"/>
-              <a:t>bilance</a:t>
-            </a:r>
-            <a:r>
-              <a:rPr lang="de-DE" dirty="0"/>
-              <a:t> </a:t>
-            </a:r>
-          </a:p>
-          <a:p>
-            <a:r>
-              <a:rPr lang="de-DE" dirty="0" err="1"/>
-              <a:t>Offer</a:t>
-            </a:r>
-            <a:r>
-              <a:rPr lang="de-DE" dirty="0"/>
-              <a:t> </a:t>
-            </a:r>
-            <a:r>
-              <a:rPr lang="de-DE" dirty="0" err="1"/>
-              <a:t>tools</a:t>
-            </a:r>
-            <a:r>
-              <a:rPr lang="de-DE" dirty="0"/>
-              <a:t> </a:t>
-            </a:r>
-            <a:r>
-              <a:rPr lang="de-DE" dirty="0" err="1"/>
-              <a:t>for</a:t>
-            </a:r>
-            <a:r>
-              <a:rPr lang="de-DE" dirty="0"/>
-              <a:t> </a:t>
-            </a:r>
-            <a:r>
-              <a:rPr lang="de-DE" dirty="0" err="1"/>
-              <a:t>bilance</a:t>
-            </a:r>
-            <a:r>
-              <a:rPr lang="de-DE" dirty="0"/>
-              <a:t> </a:t>
-            </a:r>
-            <a:r>
-              <a:rPr lang="de-DE" dirty="0" err="1"/>
-              <a:t>analysis</a:t>
-            </a:r>
-            <a:endParaRPr lang="de-DE" dirty="0"/>
-          </a:p>
-          <a:p>
-            <a:pPr lvl="1"/>
-            <a:r>
-              <a:rPr lang="de-DE" dirty="0" err="1"/>
-              <a:t>Characterization</a:t>
-            </a:r>
-            <a:r>
-              <a:rPr lang="de-DE" dirty="0"/>
-              <a:t> </a:t>
-            </a:r>
-            <a:r>
-              <a:rPr lang="de-DE" dirty="0" err="1"/>
-              <a:t>of</a:t>
-            </a:r>
-            <a:r>
-              <a:rPr lang="de-DE" dirty="0"/>
-              <a:t> </a:t>
-            </a:r>
-            <a:r>
-              <a:rPr lang="de-DE" dirty="0" err="1"/>
-              <a:t>transactions</a:t>
-            </a:r>
-            <a:endParaRPr lang="de-DE" dirty="0"/>
-          </a:p>
-          <a:p>
-            <a:pPr lvl="1"/>
-            <a:r>
-              <a:rPr lang="de-DE" dirty="0" err="1"/>
-              <a:t>Graphical</a:t>
-            </a:r>
-            <a:r>
-              <a:rPr lang="de-DE" dirty="0"/>
-              <a:t> </a:t>
-            </a:r>
-            <a:r>
-              <a:rPr lang="de-DE" dirty="0" err="1"/>
-              <a:t>representation</a:t>
-            </a:r>
-            <a:r>
-              <a:rPr lang="de-DE" dirty="0"/>
-              <a:t> </a:t>
-            </a:r>
-            <a:r>
-              <a:rPr lang="de-DE" dirty="0" err="1"/>
-              <a:t>of</a:t>
-            </a:r>
-            <a:r>
-              <a:rPr lang="de-DE" dirty="0"/>
-              <a:t> </a:t>
-            </a:r>
-            <a:r>
-              <a:rPr lang="de-DE" dirty="0" err="1"/>
-              <a:t>bilance</a:t>
-            </a:r>
-            <a:r>
-              <a:rPr lang="de-DE" dirty="0"/>
-              <a:t> </a:t>
-            </a:r>
           </a:p>
         </p:txBody>
       </p:sp>
@@ -5023,6 +4113,1024 @@
 </p:sld>
 </file>
 
+<file path=ppt/slides/slide2.xml><?xml version="1.0" encoding="utf-8"?>
+<p:sld xmlns:a="http://schemas.openxmlformats.org/drawingml/2006/main" xmlns:r="http://schemas.openxmlformats.org/officeDocument/2006/relationships" xmlns:p="http://schemas.openxmlformats.org/presentationml/2006/main">
+  <p:cSld>
+    <p:spTree>
+      <p:nvGrpSpPr>
+        <p:cNvPr id="1" name=""/>
+        <p:cNvGrpSpPr/>
+        <p:nvPr/>
+      </p:nvGrpSpPr>
+      <p:grpSpPr>
+        <a:xfrm>
+          <a:off x="0" y="0"/>
+          <a:ext cx="0" cy="0"/>
+          <a:chOff x="0" y="0"/>
+          <a:chExt cx="0" cy="0"/>
+        </a:xfrm>
+      </p:grpSpPr>
+      <p:sp>
+        <p:nvSpPr>
+          <p:cNvPr id="5" name="Titel 4">
+            <a:extLst>
+              <a:ext uri="{FF2B5EF4-FFF2-40B4-BE49-F238E27FC236}">
+                <a16:creationId xmlns:a16="http://schemas.microsoft.com/office/drawing/2014/main" id="{64A1C667-DF13-D4A2-08C4-16AEA4519C83}"/>
+              </a:ext>
+            </a:extLst>
+          </p:cNvPr>
+          <p:cNvSpPr>
+            <a:spLocks noGrp="1"/>
+          </p:cNvSpPr>
+          <p:nvPr>
+            <p:ph type="title"/>
+          </p:nvPr>
+        </p:nvSpPr>
+        <p:spPr/>
+        <p:txBody>
+          <a:bodyPr/>
+          <a:lstStyle/>
+          <a:p>
+            <a:r>
+              <a:rPr lang="de-DE" dirty="0"/>
+              <a:t>Software </a:t>
+            </a:r>
+            <a:r>
+              <a:rPr lang="de-DE" dirty="0" err="1"/>
+              <a:t>architecture</a:t>
+            </a:r>
+            <a:endParaRPr lang="de-DE" dirty="0"/>
+          </a:p>
+        </p:txBody>
+      </p:sp>
+      <p:sp>
+        <p:nvSpPr>
+          <p:cNvPr id="6" name="Rechteck 5">
+            <a:extLst>
+              <a:ext uri="{FF2B5EF4-FFF2-40B4-BE49-F238E27FC236}">
+                <a16:creationId xmlns:a16="http://schemas.microsoft.com/office/drawing/2014/main" id="{3178E457-9AA3-A58B-1C46-B9DF9B617CB3}"/>
+              </a:ext>
+            </a:extLst>
+          </p:cNvPr>
+          <p:cNvSpPr/>
+          <p:nvPr/>
+        </p:nvSpPr>
+        <p:spPr>
+          <a:xfrm>
+            <a:off x="4275835" y="1530285"/>
+            <a:ext cx="2901885" cy="1864151"/>
+          </a:xfrm>
+          <a:prstGeom prst="rect">
+            <a:avLst/>
+          </a:prstGeom>
+          <a:solidFill>
+            <a:schemeClr val="bg1"/>
+          </a:solidFill>
+        </p:spPr>
+        <p:style>
+          <a:lnRef idx="2">
+            <a:schemeClr val="accent1">
+              <a:shade val="15000"/>
+            </a:schemeClr>
+          </a:lnRef>
+          <a:fillRef idx="1">
+            <a:schemeClr val="accent1"/>
+          </a:fillRef>
+          <a:effectRef idx="0">
+            <a:schemeClr val="accent1"/>
+          </a:effectRef>
+          <a:fontRef idx="minor">
+            <a:schemeClr val="lt1"/>
+          </a:fontRef>
+        </p:style>
+        <p:txBody>
+          <a:bodyPr rtlCol="0" anchor="ctr"/>
+          <a:lstStyle/>
+          <a:p>
+            <a:pPr algn="just"/>
+            <a:r>
+              <a:rPr lang="de-DE" b="1" dirty="0">
+                <a:solidFill>
+                  <a:schemeClr val="tx1"/>
+                </a:solidFill>
+              </a:rPr>
+              <a:t>User interface:</a:t>
+            </a:r>
+          </a:p>
+          <a:p>
+            <a:pPr marL="285750" indent="-285750" algn="just">
+              <a:buFont typeface="Arial" panose="020B0604020202020204" pitchFamily="34" charset="0"/>
+              <a:buChar char="•"/>
+            </a:pPr>
+            <a:r>
+              <a:rPr lang="de-DE" dirty="0">
+                <a:solidFill>
+                  <a:schemeClr val="tx1"/>
+                </a:solidFill>
+              </a:rPr>
+              <a:t>Create, </a:t>
+            </a:r>
+            <a:r>
+              <a:rPr lang="de-DE" dirty="0" err="1">
+                <a:solidFill>
+                  <a:schemeClr val="tx1"/>
+                </a:solidFill>
+              </a:rPr>
+              <a:t>edit</a:t>
+            </a:r>
+            <a:r>
+              <a:rPr lang="de-DE" dirty="0">
+                <a:solidFill>
+                  <a:schemeClr val="tx1"/>
+                </a:solidFill>
+              </a:rPr>
+              <a:t>, </a:t>
+            </a:r>
+            <a:r>
+              <a:rPr lang="de-DE" dirty="0" err="1">
+                <a:solidFill>
+                  <a:schemeClr val="tx1"/>
+                </a:solidFill>
+              </a:rPr>
+              <a:t>load</a:t>
+            </a:r>
+            <a:r>
+              <a:rPr lang="de-DE" dirty="0">
+                <a:solidFill>
+                  <a:schemeClr val="tx1"/>
+                </a:solidFill>
+              </a:rPr>
+              <a:t> and </a:t>
+            </a:r>
+            <a:r>
+              <a:rPr lang="de-DE" dirty="0" err="1">
+                <a:solidFill>
+                  <a:schemeClr val="tx1"/>
+                </a:solidFill>
+              </a:rPr>
+              <a:t>safe</a:t>
+            </a:r>
+            <a:r>
+              <a:rPr lang="de-DE" dirty="0">
+                <a:solidFill>
+                  <a:schemeClr val="tx1"/>
+                </a:solidFill>
+              </a:rPr>
+              <a:t> </a:t>
+            </a:r>
+            <a:r>
+              <a:rPr lang="de-DE" dirty="0" err="1">
+                <a:solidFill>
+                  <a:schemeClr val="tx1"/>
+                </a:solidFill>
+              </a:rPr>
+              <a:t>bilance</a:t>
+            </a:r>
+            <a:endParaRPr lang="de-DE" dirty="0">
+              <a:solidFill>
+                <a:schemeClr val="tx1"/>
+              </a:solidFill>
+            </a:endParaRPr>
+          </a:p>
+          <a:p>
+            <a:pPr marL="285750" indent="-285750" algn="just">
+              <a:buFont typeface="Arial" panose="020B0604020202020204" pitchFamily="34" charset="0"/>
+              <a:buChar char="•"/>
+            </a:pPr>
+            <a:r>
+              <a:rPr lang="de-DE" dirty="0" err="1">
+                <a:solidFill>
+                  <a:schemeClr val="tx1"/>
+                </a:solidFill>
+              </a:rPr>
+              <a:t>Contains</a:t>
+            </a:r>
+            <a:r>
+              <a:rPr lang="de-DE" dirty="0">
+                <a:solidFill>
+                  <a:schemeClr val="tx1"/>
+                </a:solidFill>
+              </a:rPr>
+              <a:t> </a:t>
+            </a:r>
+            <a:r>
+              <a:rPr lang="de-DE" dirty="0" err="1">
+                <a:solidFill>
+                  <a:schemeClr val="tx1"/>
+                </a:solidFill>
+              </a:rPr>
+              <a:t>graphical</a:t>
+            </a:r>
+            <a:r>
+              <a:rPr lang="de-DE" dirty="0">
+                <a:solidFill>
+                  <a:schemeClr val="tx1"/>
+                </a:solidFill>
+              </a:rPr>
+              <a:t> </a:t>
+            </a:r>
+            <a:r>
+              <a:rPr lang="de-DE" dirty="0" err="1">
+                <a:solidFill>
+                  <a:schemeClr val="tx1"/>
+                </a:solidFill>
+              </a:rPr>
+              <a:t>representations</a:t>
+            </a:r>
+            <a:r>
+              <a:rPr lang="de-DE" dirty="0">
+                <a:solidFill>
+                  <a:schemeClr val="tx1"/>
+                </a:solidFill>
+              </a:rPr>
+              <a:t> </a:t>
+            </a:r>
+            <a:r>
+              <a:rPr lang="de-DE" dirty="0" err="1">
+                <a:solidFill>
+                  <a:schemeClr val="tx1"/>
+                </a:solidFill>
+              </a:rPr>
+              <a:t>of</a:t>
+            </a:r>
+            <a:r>
+              <a:rPr lang="de-DE" dirty="0">
+                <a:solidFill>
+                  <a:schemeClr val="tx1"/>
+                </a:solidFill>
+              </a:rPr>
+              <a:t> </a:t>
+            </a:r>
+            <a:r>
+              <a:rPr lang="de-DE" dirty="0" err="1">
+                <a:solidFill>
+                  <a:schemeClr val="tx1"/>
+                </a:solidFill>
+              </a:rPr>
+              <a:t>bilance</a:t>
+            </a:r>
+            <a:endParaRPr lang="de-DE" dirty="0">
+              <a:solidFill>
+                <a:schemeClr val="tx1"/>
+              </a:solidFill>
+            </a:endParaRPr>
+          </a:p>
+          <a:p>
+            <a:pPr marL="285750" indent="-285750" algn="just">
+              <a:buFont typeface="Arial" panose="020B0604020202020204" pitchFamily="34" charset="0"/>
+              <a:buChar char="•"/>
+            </a:pPr>
+            <a:r>
+              <a:rPr lang="de-DE" dirty="0">
+                <a:solidFill>
+                  <a:schemeClr val="tx1"/>
+                </a:solidFill>
+              </a:rPr>
+              <a:t>Controls </a:t>
+            </a:r>
+            <a:r>
+              <a:rPr lang="de-DE" dirty="0" err="1">
+                <a:solidFill>
+                  <a:schemeClr val="tx1"/>
+                </a:solidFill>
+              </a:rPr>
+              <a:t>analysis</a:t>
+            </a:r>
+            <a:endParaRPr lang="de-DE" dirty="0">
+              <a:solidFill>
+                <a:schemeClr val="tx1"/>
+              </a:solidFill>
+            </a:endParaRPr>
+          </a:p>
+          <a:p>
+            <a:pPr marL="285750" indent="-285750" algn="just">
+              <a:buFont typeface="Arial" panose="020B0604020202020204" pitchFamily="34" charset="0"/>
+              <a:buChar char="•"/>
+            </a:pPr>
+            <a:endParaRPr lang="de-DE" dirty="0">
+              <a:solidFill>
+                <a:schemeClr val="tx1"/>
+              </a:solidFill>
+            </a:endParaRPr>
+          </a:p>
+        </p:txBody>
+      </p:sp>
+      <p:cxnSp>
+        <p:nvCxnSpPr>
+          <p:cNvPr id="8" name="Gerade Verbindung mit Pfeil 7">
+            <a:extLst>
+              <a:ext uri="{FF2B5EF4-FFF2-40B4-BE49-F238E27FC236}">
+                <a16:creationId xmlns:a16="http://schemas.microsoft.com/office/drawing/2014/main" id="{7702F2A7-BA4D-62C7-435D-5144C3693BE3}"/>
+              </a:ext>
+            </a:extLst>
+          </p:cNvPr>
+          <p:cNvCxnSpPr>
+            <a:cxnSpLocks/>
+            <a:stCxn id="6" idx="1"/>
+            <a:endCxn id="10" idx="0"/>
+          </p:cNvCxnSpPr>
+          <p:nvPr/>
+        </p:nvCxnSpPr>
+        <p:spPr>
+          <a:xfrm flipH="1">
+            <a:off x="1992398" y="2462361"/>
+            <a:ext cx="2283437" cy="568276"/>
+          </a:xfrm>
+          <a:prstGeom prst="straightConnector1">
+            <a:avLst/>
+          </a:prstGeom>
+          <a:ln>
+            <a:solidFill>
+              <a:schemeClr val="tx1"/>
+            </a:solidFill>
+            <a:headEnd type="triangle" w="med" len="med"/>
+            <a:tailEnd type="triangle" w="med" len="med"/>
+          </a:ln>
+        </p:spPr>
+        <p:style>
+          <a:lnRef idx="1">
+            <a:schemeClr val="accent1"/>
+          </a:lnRef>
+          <a:fillRef idx="0">
+            <a:schemeClr val="accent1"/>
+          </a:fillRef>
+          <a:effectRef idx="0">
+            <a:schemeClr val="accent1"/>
+          </a:effectRef>
+          <a:fontRef idx="minor">
+            <a:schemeClr val="tx1"/>
+          </a:fontRef>
+        </p:style>
+      </p:cxnSp>
+      <p:sp>
+        <p:nvSpPr>
+          <p:cNvPr id="10" name="Rechteck 9">
+            <a:extLst>
+              <a:ext uri="{FF2B5EF4-FFF2-40B4-BE49-F238E27FC236}">
+                <a16:creationId xmlns:a16="http://schemas.microsoft.com/office/drawing/2014/main" id="{97EFD330-3FEC-4227-524F-D94AD9EC6656}"/>
+              </a:ext>
+            </a:extLst>
+          </p:cNvPr>
+          <p:cNvSpPr/>
+          <p:nvPr/>
+        </p:nvSpPr>
+        <p:spPr>
+          <a:xfrm>
+            <a:off x="838200" y="3030637"/>
+            <a:ext cx="2308395" cy="2022130"/>
+          </a:xfrm>
+          <a:prstGeom prst="rect">
+            <a:avLst/>
+          </a:prstGeom>
+          <a:solidFill>
+            <a:schemeClr val="bg1"/>
+          </a:solidFill>
+        </p:spPr>
+        <p:style>
+          <a:lnRef idx="2">
+            <a:schemeClr val="accent1">
+              <a:shade val="15000"/>
+            </a:schemeClr>
+          </a:lnRef>
+          <a:fillRef idx="1">
+            <a:schemeClr val="accent1"/>
+          </a:fillRef>
+          <a:effectRef idx="0">
+            <a:schemeClr val="accent1"/>
+          </a:effectRef>
+          <a:fontRef idx="minor">
+            <a:schemeClr val="lt1"/>
+          </a:fontRef>
+        </p:style>
+        <p:txBody>
+          <a:bodyPr rtlCol="0" anchor="ctr"/>
+          <a:lstStyle/>
+          <a:p>
+            <a:pPr algn="just"/>
+            <a:r>
+              <a:rPr lang="de-DE" b="1" dirty="0">
+                <a:solidFill>
+                  <a:schemeClr val="tx1"/>
+                </a:solidFill>
+              </a:rPr>
+              <a:t>Database:</a:t>
+            </a:r>
+          </a:p>
+          <a:p>
+            <a:pPr marL="285750" indent="-285750" algn="just">
+              <a:buFont typeface="Arial" panose="020B0604020202020204" pitchFamily="34" charset="0"/>
+              <a:buChar char="•"/>
+            </a:pPr>
+            <a:r>
+              <a:rPr lang="de-DE" dirty="0">
+                <a:solidFill>
+                  <a:schemeClr val="tx1"/>
+                </a:solidFill>
+              </a:rPr>
+              <a:t>Stores </a:t>
+            </a:r>
+            <a:r>
+              <a:rPr lang="de-DE" dirty="0" err="1">
+                <a:solidFill>
+                  <a:schemeClr val="tx1"/>
+                </a:solidFill>
+              </a:rPr>
+              <a:t>informations</a:t>
+            </a:r>
+            <a:r>
+              <a:rPr lang="de-DE" dirty="0">
+                <a:solidFill>
+                  <a:schemeClr val="tx1"/>
+                </a:solidFill>
+              </a:rPr>
+              <a:t> </a:t>
+            </a:r>
+            <a:r>
+              <a:rPr lang="de-DE" dirty="0" err="1">
+                <a:solidFill>
+                  <a:schemeClr val="tx1"/>
+                </a:solidFill>
+              </a:rPr>
+              <a:t>of</a:t>
+            </a:r>
+            <a:r>
+              <a:rPr lang="de-DE" dirty="0">
+                <a:solidFill>
+                  <a:schemeClr val="tx1"/>
+                </a:solidFill>
+              </a:rPr>
+              <a:t> </a:t>
+            </a:r>
+            <a:r>
+              <a:rPr lang="de-DE" dirty="0" err="1">
+                <a:solidFill>
+                  <a:schemeClr val="tx1"/>
+                </a:solidFill>
+              </a:rPr>
+              <a:t>bilance</a:t>
+            </a:r>
+            <a:r>
+              <a:rPr lang="de-DE" dirty="0">
+                <a:solidFill>
+                  <a:schemeClr val="tx1"/>
+                </a:solidFill>
+              </a:rPr>
+              <a:t>, i.e.: </a:t>
+            </a:r>
+            <a:r>
+              <a:rPr lang="de-DE" dirty="0" err="1">
+                <a:solidFill>
+                  <a:schemeClr val="tx1"/>
+                </a:solidFill>
+              </a:rPr>
+              <a:t>Amount</a:t>
+            </a:r>
+            <a:r>
+              <a:rPr lang="de-DE" dirty="0">
+                <a:solidFill>
+                  <a:schemeClr val="tx1"/>
+                </a:solidFill>
+              </a:rPr>
+              <a:t>, </a:t>
+            </a:r>
+            <a:r>
+              <a:rPr lang="de-DE" dirty="0" err="1">
+                <a:solidFill>
+                  <a:schemeClr val="tx1"/>
+                </a:solidFill>
+              </a:rPr>
+              <a:t>transaction</a:t>
+            </a:r>
+            <a:r>
+              <a:rPr lang="de-DE" dirty="0">
+                <a:solidFill>
+                  <a:schemeClr val="tx1"/>
+                </a:solidFill>
+              </a:rPr>
+              <a:t> date</a:t>
+            </a:r>
+          </a:p>
+        </p:txBody>
+      </p:sp>
+      <p:cxnSp>
+        <p:nvCxnSpPr>
+          <p:cNvPr id="20" name="Gerade Verbindung mit Pfeil 19">
+            <a:extLst>
+              <a:ext uri="{FF2B5EF4-FFF2-40B4-BE49-F238E27FC236}">
+                <a16:creationId xmlns:a16="http://schemas.microsoft.com/office/drawing/2014/main" id="{E491045D-8881-4253-D547-BFAD41EAA188}"/>
+              </a:ext>
+            </a:extLst>
+          </p:cNvPr>
+          <p:cNvCxnSpPr>
+            <a:cxnSpLocks/>
+            <a:stCxn id="10" idx="2"/>
+            <a:endCxn id="21" idx="1"/>
+          </p:cNvCxnSpPr>
+          <p:nvPr/>
+        </p:nvCxnSpPr>
+        <p:spPr>
+          <a:xfrm>
+            <a:off x="1992398" y="5052767"/>
+            <a:ext cx="2293057" cy="1000437"/>
+          </a:xfrm>
+          <a:prstGeom prst="straightConnector1">
+            <a:avLst/>
+          </a:prstGeom>
+          <a:ln>
+            <a:solidFill>
+              <a:schemeClr val="tx1"/>
+            </a:solidFill>
+            <a:headEnd type="triangle" w="med" len="med"/>
+            <a:tailEnd type="triangle" w="med" len="med"/>
+          </a:ln>
+        </p:spPr>
+        <p:style>
+          <a:lnRef idx="1">
+            <a:schemeClr val="accent1"/>
+          </a:lnRef>
+          <a:fillRef idx="0">
+            <a:schemeClr val="accent1"/>
+          </a:fillRef>
+          <a:effectRef idx="0">
+            <a:schemeClr val="accent1"/>
+          </a:effectRef>
+          <a:fontRef idx="minor">
+            <a:schemeClr val="tx1"/>
+          </a:fontRef>
+        </p:style>
+      </p:cxnSp>
+      <p:sp>
+        <p:nvSpPr>
+          <p:cNvPr id="21" name="Rechteck 20">
+            <a:extLst>
+              <a:ext uri="{FF2B5EF4-FFF2-40B4-BE49-F238E27FC236}">
+                <a16:creationId xmlns:a16="http://schemas.microsoft.com/office/drawing/2014/main" id="{7F1D006A-BB90-05B9-9953-192EE72FEA9E}"/>
+              </a:ext>
+            </a:extLst>
+          </p:cNvPr>
+          <p:cNvSpPr/>
+          <p:nvPr/>
+        </p:nvSpPr>
+        <p:spPr>
+          <a:xfrm>
+            <a:off x="4285455" y="5443530"/>
+            <a:ext cx="2778949" cy="1219348"/>
+          </a:xfrm>
+          <a:prstGeom prst="rect">
+            <a:avLst/>
+          </a:prstGeom>
+          <a:solidFill>
+            <a:schemeClr val="bg1"/>
+          </a:solidFill>
+        </p:spPr>
+        <p:style>
+          <a:lnRef idx="2">
+            <a:schemeClr val="accent1">
+              <a:shade val="15000"/>
+            </a:schemeClr>
+          </a:lnRef>
+          <a:fillRef idx="1">
+            <a:schemeClr val="accent1"/>
+          </a:fillRef>
+          <a:effectRef idx="0">
+            <a:schemeClr val="accent1"/>
+          </a:effectRef>
+          <a:fontRef idx="minor">
+            <a:schemeClr val="lt1"/>
+          </a:fontRef>
+        </p:style>
+        <p:txBody>
+          <a:bodyPr rtlCol="0" anchor="ctr"/>
+          <a:lstStyle/>
+          <a:p>
+            <a:pPr algn="just"/>
+            <a:r>
+              <a:rPr lang="de-DE" b="1" dirty="0">
+                <a:solidFill>
+                  <a:schemeClr val="tx1"/>
+                </a:solidFill>
+              </a:rPr>
+              <a:t>Analyzer:</a:t>
+            </a:r>
+          </a:p>
+          <a:p>
+            <a:pPr marL="285750" indent="-285750" algn="just">
+              <a:buFont typeface="Arial" panose="020B0604020202020204" pitchFamily="34" charset="0"/>
+              <a:buChar char="•"/>
+            </a:pPr>
+            <a:r>
+              <a:rPr lang="de-DE" dirty="0">
+                <a:solidFill>
+                  <a:schemeClr val="tx1"/>
+                </a:solidFill>
+              </a:rPr>
+              <a:t>Access </a:t>
+            </a:r>
+            <a:r>
+              <a:rPr lang="de-DE" dirty="0" err="1">
+                <a:solidFill>
+                  <a:schemeClr val="tx1"/>
+                </a:solidFill>
+              </a:rPr>
+              <a:t>data</a:t>
+            </a:r>
+            <a:r>
+              <a:rPr lang="de-DE" dirty="0">
+                <a:solidFill>
+                  <a:schemeClr val="tx1"/>
+                </a:solidFill>
+              </a:rPr>
+              <a:t> </a:t>
+            </a:r>
+            <a:r>
+              <a:rPr lang="de-DE" dirty="0" err="1">
+                <a:solidFill>
+                  <a:schemeClr val="tx1"/>
+                </a:solidFill>
+              </a:rPr>
+              <a:t>of</a:t>
+            </a:r>
+            <a:r>
+              <a:rPr lang="de-DE" dirty="0">
+                <a:solidFill>
+                  <a:schemeClr val="tx1"/>
+                </a:solidFill>
+              </a:rPr>
+              <a:t> </a:t>
+            </a:r>
+            <a:r>
+              <a:rPr lang="de-DE" dirty="0" err="1">
+                <a:solidFill>
+                  <a:schemeClr val="tx1"/>
+                </a:solidFill>
+              </a:rPr>
+              <a:t>bilance</a:t>
+            </a:r>
+            <a:r>
+              <a:rPr lang="de-DE" dirty="0">
+                <a:solidFill>
+                  <a:schemeClr val="tx1"/>
+                </a:solidFill>
+              </a:rPr>
+              <a:t> </a:t>
+            </a:r>
+          </a:p>
+          <a:p>
+            <a:pPr marL="285750" indent="-285750" algn="just">
+              <a:buFont typeface="Arial" panose="020B0604020202020204" pitchFamily="34" charset="0"/>
+              <a:buChar char="•"/>
+            </a:pPr>
+            <a:r>
+              <a:rPr lang="de-DE" dirty="0" err="1">
+                <a:solidFill>
+                  <a:schemeClr val="tx1"/>
+                </a:solidFill>
+              </a:rPr>
+              <a:t>Categorizes</a:t>
+            </a:r>
+            <a:r>
+              <a:rPr lang="de-DE" dirty="0">
+                <a:solidFill>
+                  <a:schemeClr val="tx1"/>
+                </a:solidFill>
+              </a:rPr>
+              <a:t> </a:t>
+            </a:r>
+            <a:r>
+              <a:rPr lang="de-DE" dirty="0" err="1">
+                <a:solidFill>
+                  <a:schemeClr val="tx1"/>
+                </a:solidFill>
+              </a:rPr>
+              <a:t>bilance</a:t>
+            </a:r>
+            <a:r>
+              <a:rPr lang="de-DE" dirty="0">
+                <a:solidFill>
+                  <a:schemeClr val="tx1"/>
+                </a:solidFill>
+              </a:rPr>
+              <a:t> </a:t>
+            </a:r>
+            <a:r>
+              <a:rPr lang="de-DE" dirty="0" err="1">
+                <a:solidFill>
+                  <a:schemeClr val="tx1"/>
+                </a:solidFill>
+              </a:rPr>
+              <a:t>data</a:t>
+            </a:r>
+            <a:endParaRPr lang="de-DE" dirty="0">
+              <a:solidFill>
+                <a:schemeClr val="tx1"/>
+              </a:solidFill>
+            </a:endParaRPr>
+          </a:p>
+          <a:p>
+            <a:pPr marL="285750" indent="-285750" algn="just">
+              <a:buFont typeface="Arial" panose="020B0604020202020204" pitchFamily="34" charset="0"/>
+              <a:buChar char="•"/>
+            </a:pPr>
+            <a:r>
+              <a:rPr lang="de-DE" dirty="0" err="1">
+                <a:solidFill>
+                  <a:schemeClr val="tx1"/>
+                </a:solidFill>
+              </a:rPr>
+              <a:t>Performs</a:t>
+            </a:r>
+            <a:r>
+              <a:rPr lang="de-DE" dirty="0">
+                <a:solidFill>
+                  <a:schemeClr val="tx1"/>
+                </a:solidFill>
+              </a:rPr>
+              <a:t> </a:t>
+            </a:r>
+            <a:r>
+              <a:rPr lang="de-DE" dirty="0" err="1">
+                <a:solidFill>
+                  <a:schemeClr val="tx1"/>
+                </a:solidFill>
+              </a:rPr>
+              <a:t>calculations</a:t>
+            </a:r>
+            <a:r>
+              <a:rPr lang="de-DE" dirty="0">
+                <a:solidFill>
+                  <a:schemeClr val="tx1"/>
+                </a:solidFill>
+              </a:rPr>
+              <a:t> </a:t>
+            </a:r>
+          </a:p>
+        </p:txBody>
+      </p:sp>
+      <p:sp>
+        <p:nvSpPr>
+          <p:cNvPr id="27" name="Rechteck 26">
+            <a:extLst>
+              <a:ext uri="{FF2B5EF4-FFF2-40B4-BE49-F238E27FC236}">
+                <a16:creationId xmlns:a16="http://schemas.microsoft.com/office/drawing/2014/main" id="{E9D2F5E7-BA8F-730A-C46D-E7B454053531}"/>
+              </a:ext>
+            </a:extLst>
+          </p:cNvPr>
+          <p:cNvSpPr/>
+          <p:nvPr/>
+        </p:nvSpPr>
+        <p:spPr>
+          <a:xfrm>
+            <a:off x="8737070" y="3030637"/>
+            <a:ext cx="2230231" cy="1762474"/>
+          </a:xfrm>
+          <a:prstGeom prst="rect">
+            <a:avLst/>
+          </a:prstGeom>
+          <a:solidFill>
+            <a:schemeClr val="bg1"/>
+          </a:solidFill>
+        </p:spPr>
+        <p:style>
+          <a:lnRef idx="2">
+            <a:schemeClr val="accent1">
+              <a:shade val="15000"/>
+            </a:schemeClr>
+          </a:lnRef>
+          <a:fillRef idx="1">
+            <a:schemeClr val="accent1"/>
+          </a:fillRef>
+          <a:effectRef idx="0">
+            <a:schemeClr val="accent1"/>
+          </a:effectRef>
+          <a:fontRef idx="minor">
+            <a:schemeClr val="lt1"/>
+          </a:fontRef>
+        </p:style>
+        <p:txBody>
+          <a:bodyPr rtlCol="0" anchor="ctr"/>
+          <a:lstStyle/>
+          <a:p>
+            <a:pPr algn="just"/>
+            <a:r>
+              <a:rPr lang="de-DE" b="1" dirty="0">
+                <a:solidFill>
+                  <a:schemeClr val="tx1"/>
+                </a:solidFill>
+              </a:rPr>
+              <a:t>Viewer:</a:t>
+            </a:r>
+          </a:p>
+          <a:p>
+            <a:pPr marL="285750" indent="-285750" algn="just">
+              <a:buFont typeface="Arial" panose="020B0604020202020204" pitchFamily="34" charset="0"/>
+              <a:buChar char="•"/>
+            </a:pPr>
+            <a:r>
+              <a:rPr lang="de-DE" dirty="0" err="1">
+                <a:solidFill>
+                  <a:schemeClr val="tx1"/>
+                </a:solidFill>
+              </a:rPr>
+              <a:t>Provides</a:t>
+            </a:r>
+            <a:r>
+              <a:rPr lang="de-DE" dirty="0">
+                <a:solidFill>
+                  <a:schemeClr val="tx1"/>
+                </a:solidFill>
+              </a:rPr>
+              <a:t> </a:t>
+            </a:r>
+            <a:r>
+              <a:rPr lang="de-DE" dirty="0" err="1">
+                <a:solidFill>
+                  <a:schemeClr val="tx1"/>
+                </a:solidFill>
+              </a:rPr>
+              <a:t>graphical</a:t>
+            </a:r>
+            <a:r>
+              <a:rPr lang="de-DE" dirty="0">
+                <a:solidFill>
+                  <a:schemeClr val="tx1"/>
+                </a:solidFill>
+              </a:rPr>
+              <a:t> </a:t>
+            </a:r>
+            <a:r>
+              <a:rPr lang="de-DE" dirty="0" err="1">
+                <a:solidFill>
+                  <a:schemeClr val="tx1"/>
+                </a:solidFill>
+              </a:rPr>
+              <a:t>representations</a:t>
+            </a:r>
+            <a:r>
+              <a:rPr lang="de-DE" dirty="0">
+                <a:solidFill>
+                  <a:schemeClr val="tx1"/>
+                </a:solidFill>
+              </a:rPr>
+              <a:t> (X-Y </a:t>
+            </a:r>
+            <a:r>
+              <a:rPr lang="de-DE" dirty="0" err="1">
+                <a:solidFill>
+                  <a:schemeClr val="tx1"/>
+                </a:solidFill>
+              </a:rPr>
+              <a:t>diagramns</a:t>
+            </a:r>
+            <a:r>
+              <a:rPr lang="de-DE" dirty="0">
+                <a:solidFill>
+                  <a:schemeClr val="tx1"/>
+                </a:solidFill>
+              </a:rPr>
+              <a:t>, </a:t>
+            </a:r>
+            <a:r>
+              <a:rPr lang="de-DE" dirty="0" err="1">
+                <a:solidFill>
+                  <a:schemeClr val="tx1"/>
+                </a:solidFill>
+              </a:rPr>
+              <a:t>cake</a:t>
+            </a:r>
+            <a:r>
+              <a:rPr lang="de-DE" dirty="0">
+                <a:solidFill>
+                  <a:schemeClr val="tx1"/>
+                </a:solidFill>
+              </a:rPr>
+              <a:t> </a:t>
+            </a:r>
+            <a:r>
+              <a:rPr lang="de-DE" dirty="0" err="1">
+                <a:solidFill>
+                  <a:schemeClr val="tx1"/>
+                </a:solidFill>
+              </a:rPr>
+              <a:t>diagrams</a:t>
+            </a:r>
+            <a:r>
+              <a:rPr lang="de-DE" dirty="0">
+                <a:solidFill>
+                  <a:schemeClr val="tx1"/>
+                </a:solidFill>
+              </a:rPr>
+              <a:t>)</a:t>
+            </a:r>
+          </a:p>
+        </p:txBody>
+      </p:sp>
+      <p:cxnSp>
+        <p:nvCxnSpPr>
+          <p:cNvPr id="28" name="Gerade Verbindung mit Pfeil 27">
+            <a:extLst>
+              <a:ext uri="{FF2B5EF4-FFF2-40B4-BE49-F238E27FC236}">
+                <a16:creationId xmlns:a16="http://schemas.microsoft.com/office/drawing/2014/main" id="{60B4BDF2-ED49-44FD-6154-5F9BCC61BC08}"/>
+              </a:ext>
+            </a:extLst>
+          </p:cNvPr>
+          <p:cNvCxnSpPr>
+            <a:cxnSpLocks/>
+            <a:stCxn id="21" idx="3"/>
+            <a:endCxn id="27" idx="2"/>
+          </p:cNvCxnSpPr>
+          <p:nvPr/>
+        </p:nvCxnSpPr>
+        <p:spPr>
+          <a:xfrm flipV="1">
+            <a:off x="7064404" y="4793111"/>
+            <a:ext cx="2787782" cy="1260093"/>
+          </a:xfrm>
+          <a:prstGeom prst="straightConnector1">
+            <a:avLst/>
+          </a:prstGeom>
+          <a:ln>
+            <a:solidFill>
+              <a:schemeClr val="tx1"/>
+            </a:solidFill>
+            <a:headEnd type="triangle" w="med" len="med"/>
+            <a:tailEnd type="triangle" w="med" len="med"/>
+          </a:ln>
+        </p:spPr>
+        <p:style>
+          <a:lnRef idx="1">
+            <a:schemeClr val="accent1"/>
+          </a:lnRef>
+          <a:fillRef idx="0">
+            <a:schemeClr val="accent1"/>
+          </a:fillRef>
+          <a:effectRef idx="0">
+            <a:schemeClr val="accent1"/>
+          </a:effectRef>
+          <a:fontRef idx="minor">
+            <a:schemeClr val="tx1"/>
+          </a:fontRef>
+        </p:style>
+      </p:cxnSp>
+      <p:cxnSp>
+        <p:nvCxnSpPr>
+          <p:cNvPr id="39" name="Gerade Verbindung mit Pfeil 38">
+            <a:extLst>
+              <a:ext uri="{FF2B5EF4-FFF2-40B4-BE49-F238E27FC236}">
+                <a16:creationId xmlns:a16="http://schemas.microsoft.com/office/drawing/2014/main" id="{EEF5B1C1-F741-2765-CD56-7C5049DA8890}"/>
+              </a:ext>
+            </a:extLst>
+          </p:cNvPr>
+          <p:cNvCxnSpPr>
+            <a:cxnSpLocks/>
+            <a:stCxn id="6" idx="3"/>
+            <a:endCxn id="27" idx="0"/>
+          </p:cNvCxnSpPr>
+          <p:nvPr/>
+        </p:nvCxnSpPr>
+        <p:spPr>
+          <a:xfrm>
+            <a:off x="7177720" y="2462361"/>
+            <a:ext cx="2674466" cy="568276"/>
+          </a:xfrm>
+          <a:prstGeom prst="straightConnector1">
+            <a:avLst/>
+          </a:prstGeom>
+          <a:ln>
+            <a:solidFill>
+              <a:schemeClr val="tx1"/>
+            </a:solidFill>
+            <a:headEnd type="triangle" w="med" len="med"/>
+            <a:tailEnd type="triangle" w="med" len="med"/>
+          </a:ln>
+        </p:spPr>
+        <p:style>
+          <a:lnRef idx="1">
+            <a:schemeClr val="accent1"/>
+          </a:lnRef>
+          <a:fillRef idx="0">
+            <a:schemeClr val="accent1"/>
+          </a:fillRef>
+          <a:effectRef idx="0">
+            <a:schemeClr val="accent1"/>
+          </a:effectRef>
+          <a:fontRef idx="minor">
+            <a:schemeClr val="tx1"/>
+          </a:fontRef>
+        </p:style>
+      </p:cxnSp>
+    </p:spTree>
+    <p:extLst>
+      <p:ext uri="{BB962C8B-B14F-4D97-AF65-F5344CB8AC3E}">
+        <p14:creationId xmlns:p14="http://schemas.microsoft.com/office/powerpoint/2010/main" val="1637764307"/>
+      </p:ext>
+    </p:extLst>
+  </p:cSld>
+  <p:clrMapOvr>
+    <a:masterClrMapping/>
+  </p:clrMapOvr>
+</p:sld>
+</file>
+
 <file path=ppt/slides/slide3.xml><?xml version="1.0" encoding="utf-8"?>
 <p:sld xmlns:a="http://schemas.openxmlformats.org/drawingml/2006/main" xmlns:r="http://schemas.openxmlformats.org/officeDocument/2006/relationships" xmlns:p="http://schemas.openxmlformats.org/presentationml/2006/main">
   <p:cSld>
@@ -5045,7 +5153,7 @@
           <p:cNvPr id="2" name="Titel 1">
             <a:extLst>
               <a:ext uri="{FF2B5EF4-FFF2-40B4-BE49-F238E27FC236}">
-                <a16:creationId xmlns:a16="http://schemas.microsoft.com/office/drawing/2014/main" id="{E249F39E-40D7-69A2-AD64-9A4210469EF7}"/>
+                <a16:creationId xmlns:a16="http://schemas.microsoft.com/office/drawing/2014/main" id="{0F090936-5B50-B999-97F9-46FBD4E4B3D6}"/>
               </a:ext>
             </a:extLst>
           </p:cNvPr>
@@ -5062,144 +5170,18 @@
           <a:lstStyle/>
           <a:p>
             <a:r>
-              <a:rPr lang="de-DE" dirty="0" err="1"/>
-              <a:t>ItemDialog</a:t>
-            </a:r>
-            <a:endParaRPr lang="de-DE" dirty="0"/>
-          </a:p>
-        </p:txBody>
-      </p:sp>
-      <p:grpSp>
-        <p:nvGrpSpPr>
-          <p:cNvPr id="14" name="Gruppieren 13">
-            <a:extLst>
-              <a:ext uri="{FF2B5EF4-FFF2-40B4-BE49-F238E27FC236}">
-                <a16:creationId xmlns:a16="http://schemas.microsoft.com/office/drawing/2014/main" id="{1B1769FF-BFDB-10E0-BA0D-89C1FEF480D5}"/>
-              </a:ext>
-            </a:extLst>
-          </p:cNvPr>
-          <p:cNvGrpSpPr/>
-          <p:nvPr/>
-        </p:nvGrpSpPr>
-        <p:grpSpPr>
-          <a:xfrm>
-            <a:off x="3124200" y="1744980"/>
-            <a:ext cx="3099434" cy="3657600"/>
-            <a:chOff x="3124200" y="1744980"/>
-            <a:chExt cx="4168140" cy="3657600"/>
-          </a:xfrm>
-        </p:grpSpPr>
-        <p:sp>
-          <p:nvSpPr>
-            <p:cNvPr id="3" name="Rechteck 2">
-              <a:extLst>
-                <a:ext uri="{FF2B5EF4-FFF2-40B4-BE49-F238E27FC236}">
-                  <a16:creationId xmlns:a16="http://schemas.microsoft.com/office/drawing/2014/main" id="{09FDDE7D-A692-CCA1-536D-CE4783FC8E1F}"/>
-                </a:ext>
-              </a:extLst>
-            </p:cNvPr>
-            <p:cNvSpPr/>
-            <p:nvPr/>
-          </p:nvSpPr>
-          <p:spPr>
-            <a:xfrm>
-              <a:off x="3124200" y="1943100"/>
-              <a:ext cx="4168140" cy="3459480"/>
-            </a:xfrm>
-            <a:prstGeom prst="rect">
-              <a:avLst/>
-            </a:prstGeom>
-            <a:noFill/>
-            <a:ln w="28575">
-              <a:solidFill>
-                <a:schemeClr val="tx1"/>
-              </a:solidFill>
-            </a:ln>
-          </p:spPr>
-          <p:style>
-            <a:lnRef idx="2">
-              <a:schemeClr val="accent1">
-                <a:shade val="15000"/>
-              </a:schemeClr>
-            </a:lnRef>
-            <a:fillRef idx="1">
-              <a:schemeClr val="accent1"/>
-            </a:fillRef>
-            <a:effectRef idx="0">
-              <a:schemeClr val="accent1"/>
-            </a:effectRef>
-            <a:fontRef idx="minor">
-              <a:schemeClr val="lt1"/>
-            </a:fontRef>
-          </p:style>
-          <p:txBody>
-            <a:bodyPr rtlCol="0" anchor="ctr"/>
-            <a:lstStyle/>
-            <a:p>
-              <a:pPr algn="ctr"/>
-              <a:endParaRPr lang="de-DE"/>
-            </a:p>
-          </p:txBody>
-        </p:sp>
-        <p:sp>
-          <p:nvSpPr>
-            <p:cNvPr id="4" name="Rechteck 3">
-              <a:extLst>
-                <a:ext uri="{FF2B5EF4-FFF2-40B4-BE49-F238E27FC236}">
-                  <a16:creationId xmlns:a16="http://schemas.microsoft.com/office/drawing/2014/main" id="{B135F369-340A-CEDC-4DE8-216B484B8931}"/>
-                </a:ext>
-              </a:extLst>
-            </p:cNvPr>
-            <p:cNvSpPr/>
-            <p:nvPr/>
-          </p:nvSpPr>
-          <p:spPr>
-            <a:xfrm>
-              <a:off x="3124200" y="1744980"/>
-              <a:ext cx="4168140" cy="198120"/>
-            </a:xfrm>
-            <a:prstGeom prst="rect">
-              <a:avLst/>
-            </a:prstGeom>
-            <a:noFill/>
-            <a:ln w="28575">
-              <a:solidFill>
-                <a:schemeClr val="tx1"/>
-              </a:solidFill>
-            </a:ln>
-          </p:spPr>
-          <p:style>
-            <a:lnRef idx="2">
-              <a:schemeClr val="accent1">
-                <a:shade val="15000"/>
-              </a:schemeClr>
-            </a:lnRef>
-            <a:fillRef idx="1">
-              <a:schemeClr val="accent1"/>
-            </a:fillRef>
-            <a:effectRef idx="0">
-              <a:schemeClr val="accent1"/>
-            </a:effectRef>
-            <a:fontRef idx="minor">
-              <a:schemeClr val="lt1"/>
-            </a:fontRef>
-          </p:style>
-          <p:txBody>
-            <a:bodyPr rtlCol="0" anchor="ctr"/>
-            <a:lstStyle/>
-            <a:p>
-              <a:pPr algn="ctr"/>
-              <a:endParaRPr lang="de-DE"/>
-            </a:p>
-          </p:txBody>
-        </p:sp>
-      </p:grpSp>
-      <p:sp>
-        <p:nvSpPr>
-          <p:cNvPr id="5" name="Rechteck 4">
-            <a:extLst>
-              <a:ext uri="{FF2B5EF4-FFF2-40B4-BE49-F238E27FC236}">
-                <a16:creationId xmlns:a16="http://schemas.microsoft.com/office/drawing/2014/main" id="{2819A3FA-6B17-1C30-4C12-284BD2A859B0}"/>
+              <a:rPr lang="de-DE" dirty="0"/>
+              <a:t>User interface</a:t>
+            </a:r>
+          </a:p>
+        </p:txBody>
+      </p:sp>
+      <p:sp>
+        <p:nvSpPr>
+          <p:cNvPr id="4" name="Rechteck 3">
+            <a:extLst>
+              <a:ext uri="{FF2B5EF4-FFF2-40B4-BE49-F238E27FC236}">
+                <a16:creationId xmlns:a16="http://schemas.microsoft.com/office/drawing/2014/main" id="{41B45470-AC9E-5468-20B8-609B36A8B94C}"/>
               </a:ext>
             </a:extLst>
           </p:cNvPr>
@@ -5208,14 +5190,16 @@
         </p:nvSpPr>
         <p:spPr>
           <a:xfrm>
-            <a:off x="6046469" y="1744980"/>
-            <a:ext cx="177165" cy="198120"/>
+            <a:off x="1866507" y="1445592"/>
+            <a:ext cx="8314442" cy="4936355"/>
           </a:xfrm>
           <a:prstGeom prst="rect">
             <a:avLst/>
           </a:prstGeom>
-          <a:noFill/>
-          <a:ln w="28575">
+          <a:solidFill>
+            <a:schemeClr val="bg1"/>
+          </a:solidFill>
+          <a:ln w="38100">
             <a:solidFill>
               <a:schemeClr val="tx1"/>
             </a:solidFill>
@@ -5248,10 +5232,10 @@
       </p:sp>
       <p:sp>
         <p:nvSpPr>
-          <p:cNvPr id="6" name="Rechteck 5">
-            <a:extLst>
-              <a:ext uri="{FF2B5EF4-FFF2-40B4-BE49-F238E27FC236}">
-                <a16:creationId xmlns:a16="http://schemas.microsoft.com/office/drawing/2014/main" id="{E96704E1-9D0D-58CC-E72D-081B4A72E9CE}"/>
+          <p:cNvPr id="5" name="Rechteck 4">
+            <a:extLst>
+              <a:ext uri="{FF2B5EF4-FFF2-40B4-BE49-F238E27FC236}">
+                <a16:creationId xmlns:a16="http://schemas.microsoft.com/office/drawing/2014/main" id="{B8363374-3E01-3B2B-4C5A-60855BC8882A}"/>
               </a:ext>
             </a:extLst>
           </p:cNvPr>
@@ -5260,14 +5244,16 @@
         </p:nvSpPr>
         <p:spPr>
           <a:xfrm>
-            <a:off x="5869304" y="1744980"/>
-            <a:ext cx="177165" cy="198120"/>
+            <a:off x="1866507" y="1445591"/>
+            <a:ext cx="8314442" cy="354929"/>
           </a:xfrm>
           <a:prstGeom prst="rect">
             <a:avLst/>
           </a:prstGeom>
-          <a:noFill/>
-          <a:ln w="28575">
+          <a:solidFill>
+            <a:schemeClr val="bg1"/>
+          </a:solidFill>
+          <a:ln w="38100">
             <a:solidFill>
               <a:schemeClr val="tx1"/>
             </a:solidFill>
@@ -5300,10 +5286,10 @@
       </p:sp>
       <p:sp>
         <p:nvSpPr>
-          <p:cNvPr id="7" name="Rechteck 6">
-            <a:extLst>
-              <a:ext uri="{FF2B5EF4-FFF2-40B4-BE49-F238E27FC236}">
-                <a16:creationId xmlns:a16="http://schemas.microsoft.com/office/drawing/2014/main" id="{EC85178B-B795-8C9E-CAB0-DECD5C6B6A24}"/>
+          <p:cNvPr id="6" name="Rechteck 5">
+            <a:extLst>
+              <a:ext uri="{FF2B5EF4-FFF2-40B4-BE49-F238E27FC236}">
+                <a16:creationId xmlns:a16="http://schemas.microsoft.com/office/drawing/2014/main" id="{CDFBF02B-BC27-37EB-5602-9AB6E8F52893}"/>
               </a:ext>
             </a:extLst>
           </p:cNvPr>
@@ -5312,14 +5298,16 @@
         </p:nvSpPr>
         <p:spPr>
           <a:xfrm>
-            <a:off x="5692139" y="1744980"/>
-            <a:ext cx="177165" cy="198120"/>
+            <a:off x="1866507" y="6027018"/>
+            <a:ext cx="8314442" cy="354929"/>
           </a:xfrm>
           <a:prstGeom prst="rect">
             <a:avLst/>
           </a:prstGeom>
-          <a:noFill/>
-          <a:ln w="28575">
+          <a:solidFill>
+            <a:schemeClr val="bg1"/>
+          </a:solidFill>
+          <a:ln w="38100">
             <a:solidFill>
               <a:schemeClr val="tx1"/>
             </a:solidFill>
@@ -5352,10 +5340,10 @@
       </p:sp>
       <p:sp>
         <p:nvSpPr>
-          <p:cNvPr id="8" name="Rechteck 7">
-            <a:extLst>
-              <a:ext uri="{FF2B5EF4-FFF2-40B4-BE49-F238E27FC236}">
-                <a16:creationId xmlns:a16="http://schemas.microsoft.com/office/drawing/2014/main" id="{2E84B6B8-ED2A-5002-A0EB-ECAC0FD40DC3}"/>
+          <p:cNvPr id="7" name="Rechteck 6">
+            <a:extLst>
+              <a:ext uri="{FF2B5EF4-FFF2-40B4-BE49-F238E27FC236}">
+                <a16:creationId xmlns:a16="http://schemas.microsoft.com/office/drawing/2014/main" id="{EAE0E6C7-E29C-C10E-19CD-0170F13083C1}"/>
               </a:ext>
             </a:extLst>
           </p:cNvPr>
@@ -5364,71 +5352,16 @@
         </p:nvSpPr>
         <p:spPr>
           <a:xfrm>
-            <a:off x="3268979" y="4914901"/>
-            <a:ext cx="2827021" cy="403860"/>
-          </a:xfrm>
-          <a:prstGeom prst="rect">
-            <a:avLst/>
-          </a:prstGeom>
-          <a:noFill/>
-          <a:ln>
-            <a:solidFill>
-              <a:schemeClr val="tx1"/>
-            </a:solidFill>
-            <a:prstDash val="dash"/>
-          </a:ln>
-        </p:spPr>
-        <p:style>
-          <a:lnRef idx="2">
-            <a:schemeClr val="accent1">
-              <a:shade val="15000"/>
-            </a:schemeClr>
-          </a:lnRef>
-          <a:fillRef idx="1">
-            <a:schemeClr val="accent1"/>
-          </a:fillRef>
-          <a:effectRef idx="0">
-            <a:schemeClr val="accent1"/>
-          </a:effectRef>
-          <a:fontRef idx="minor">
-            <a:schemeClr val="lt1"/>
-          </a:fontRef>
-        </p:style>
-        <p:txBody>
-          <a:bodyPr rtlCol="0" anchor="ctr"/>
-          <a:lstStyle/>
-          <a:p>
-            <a:pPr algn="ctr"/>
-            <a:endParaRPr lang="de-DE"/>
-          </a:p>
-        </p:txBody>
-      </p:sp>
-      <p:sp>
-        <p:nvSpPr>
-          <p:cNvPr id="9" name="Rechteck 8">
-            <a:extLst>
-              <a:ext uri="{FF2B5EF4-FFF2-40B4-BE49-F238E27FC236}">
-                <a16:creationId xmlns:a16="http://schemas.microsoft.com/office/drawing/2014/main" id="{684AB492-DDB5-2D8B-5ABC-60E914A2994F}"/>
-              </a:ext>
-            </a:extLst>
-          </p:cNvPr>
-          <p:cNvSpPr/>
-          <p:nvPr/>
-        </p:nvSpPr>
-        <p:spPr>
-          <a:xfrm>
-            <a:off x="3320415" y="5029201"/>
-            <a:ext cx="1337309" cy="175260"/>
+            <a:off x="1866507" y="1800520"/>
+            <a:ext cx="3129699" cy="4226498"/>
           </a:xfrm>
           <a:prstGeom prst="rect">
             <a:avLst/>
           </a:prstGeom>
           <a:solidFill>
-            <a:schemeClr val="bg2">
-              <a:lumMod val="75000"/>
-            </a:schemeClr>
+            <a:schemeClr val="bg1"/>
           </a:solidFill>
-          <a:ln>
+          <a:ln w="38100">
             <a:solidFill>
               <a:schemeClr val="tx1"/>
             </a:solidFill>
@@ -5455,19 +5388,16 @@
           <a:lstStyle/>
           <a:p>
             <a:pPr algn="ctr"/>
-            <a:r>
-              <a:rPr lang="de-DE" sz="1200" dirty="0"/>
-              <a:t>Add</a:t>
-            </a:r>
-          </a:p>
-        </p:txBody>
-      </p:sp>
-      <p:sp>
-        <p:nvSpPr>
-          <p:cNvPr id="15" name="Rechteck 14">
-            <a:extLst>
-              <a:ext uri="{FF2B5EF4-FFF2-40B4-BE49-F238E27FC236}">
-                <a16:creationId xmlns:a16="http://schemas.microsoft.com/office/drawing/2014/main" id="{A9F4969B-2B77-109D-A0C4-FC65F645D413}"/>
+            <a:endParaRPr lang="de-DE"/>
+          </a:p>
+        </p:txBody>
+      </p:sp>
+      <p:sp>
+        <p:nvSpPr>
+          <p:cNvPr id="8" name="Rechteck 7">
+            <a:extLst>
+              <a:ext uri="{FF2B5EF4-FFF2-40B4-BE49-F238E27FC236}">
+                <a16:creationId xmlns:a16="http://schemas.microsoft.com/office/drawing/2014/main" id="{5AF00F96-2310-9D68-9112-44E1E87979D2}"/>
               </a:ext>
             </a:extLst>
           </p:cNvPr>
@@ -5476,18 +5406,16 @@
         </p:nvSpPr>
         <p:spPr>
           <a:xfrm>
-            <a:off x="4709160" y="5029201"/>
-            <a:ext cx="1337309" cy="175260"/>
+            <a:off x="4996206" y="1800520"/>
+            <a:ext cx="5184743" cy="4226498"/>
           </a:xfrm>
           <a:prstGeom prst="rect">
             <a:avLst/>
           </a:prstGeom>
           <a:solidFill>
-            <a:schemeClr val="bg2">
-              <a:lumMod val="75000"/>
-            </a:schemeClr>
+            <a:schemeClr val="bg1"/>
           </a:solidFill>
-          <a:ln>
+          <a:ln w="38100">
             <a:solidFill>
               <a:schemeClr val="tx1"/>
             </a:solidFill>
@@ -5514,106 +5442,34 @@
           <a:lstStyle/>
           <a:p>
             <a:pPr algn="ctr"/>
-            <a:r>
-              <a:rPr lang="de-DE" sz="1200" dirty="0" err="1"/>
-              <a:t>Cancel</a:t>
-            </a:r>
-            <a:endParaRPr lang="de-DE" sz="1200" dirty="0"/>
-          </a:p>
-        </p:txBody>
-      </p:sp>
-      <p:sp>
-        <p:nvSpPr>
-          <p:cNvPr id="17" name="Textfeld 16">
-            <a:extLst>
-              <a:ext uri="{FF2B5EF4-FFF2-40B4-BE49-F238E27FC236}">
-                <a16:creationId xmlns:a16="http://schemas.microsoft.com/office/drawing/2014/main" id="{50611B5C-E786-3B0F-62EB-34F62FCB6767}"/>
-              </a:ext>
-            </a:extLst>
-          </p:cNvPr>
-          <p:cNvSpPr txBox="1"/>
+            <a:endParaRPr lang="de-DE"/>
+          </a:p>
+        </p:txBody>
+      </p:sp>
+      <p:sp>
+        <p:nvSpPr>
+          <p:cNvPr id="9" name="Rechteck 8">
+            <a:extLst>
+              <a:ext uri="{FF2B5EF4-FFF2-40B4-BE49-F238E27FC236}">
+                <a16:creationId xmlns:a16="http://schemas.microsoft.com/office/drawing/2014/main" id="{7763DC73-A505-9783-0DAE-7BD8998970A1}"/>
+              </a:ext>
+            </a:extLst>
+          </p:cNvPr>
+          <p:cNvSpPr/>
           <p:nvPr/>
         </p:nvSpPr>
         <p:spPr>
           <a:xfrm>
-            <a:off x="5988367" y="1638894"/>
-            <a:ext cx="728663" cy="369332"/>
+            <a:off x="9870100" y="1500505"/>
+            <a:ext cx="235436" cy="245098"/>
           </a:xfrm>
           <a:prstGeom prst="rect">
             <a:avLst/>
           </a:prstGeom>
-          <a:noFill/>
-        </p:spPr>
-        <p:txBody>
-          <a:bodyPr wrap="square" rtlCol="0">
-            <a:spAutoFit/>
-          </a:bodyPr>
-          <a:lstStyle/>
-          <a:p>
-            <a:r>
-              <a:rPr lang="de-DE" dirty="0"/>
-              <a:t>x</a:t>
-            </a:r>
-          </a:p>
-        </p:txBody>
-      </p:sp>
-      <p:sp>
-        <p:nvSpPr>
-          <p:cNvPr id="18" name="Textfeld 17">
-            <a:extLst>
-              <a:ext uri="{FF2B5EF4-FFF2-40B4-BE49-F238E27FC236}">
-                <a16:creationId xmlns:a16="http://schemas.microsoft.com/office/drawing/2014/main" id="{878BE88F-D1FC-CFFE-41AC-9145C8BA58D8}"/>
-              </a:ext>
-            </a:extLst>
-          </p:cNvPr>
-          <p:cNvSpPr txBox="1"/>
-          <p:nvPr/>
-        </p:nvSpPr>
-        <p:spPr>
-          <a:xfrm>
-            <a:off x="5692139" y="1589325"/>
-            <a:ext cx="61913" cy="369332"/>
-          </a:xfrm>
-          <a:prstGeom prst="rect">
-            <a:avLst/>
-          </a:prstGeom>
-          <a:noFill/>
-        </p:spPr>
-        <p:txBody>
-          <a:bodyPr wrap="square" rtlCol="0">
-            <a:spAutoFit/>
-          </a:bodyPr>
-          <a:lstStyle/>
-          <a:p>
-            <a:r>
-              <a:rPr lang="de-DE" dirty="0"/>
-              <a:t>_</a:t>
-            </a:r>
-          </a:p>
-        </p:txBody>
-      </p:sp>
-      <p:sp>
-        <p:nvSpPr>
-          <p:cNvPr id="19" name="Rechteck 18">
-            <a:extLst>
-              <a:ext uri="{FF2B5EF4-FFF2-40B4-BE49-F238E27FC236}">
-                <a16:creationId xmlns:a16="http://schemas.microsoft.com/office/drawing/2014/main" id="{3E5F0CA0-52C4-E85D-A60A-2896C28267D0}"/>
-              </a:ext>
-            </a:extLst>
-          </p:cNvPr>
-          <p:cNvSpPr/>
-          <p:nvPr/>
-        </p:nvSpPr>
-        <p:spPr>
-          <a:xfrm>
-            <a:off x="5914865" y="1803083"/>
-            <a:ext cx="85725" cy="85725"/>
-          </a:xfrm>
-          <a:prstGeom prst="rect">
-            <a:avLst/>
-          </a:prstGeom>
-          <a:noFill/>
-          <a:ln w="12700">
+          <a:solidFill>
+            <a:schemeClr val="bg1"/>
+          </a:solidFill>
+          <a:ln w="38100">
             <a:solidFill>
               <a:schemeClr val="tx1"/>
             </a:solidFill>
@@ -5646,10 +5502,10 @@
       </p:sp>
       <p:sp>
         <p:nvSpPr>
-          <p:cNvPr id="20" name="Rechteck 19">
-            <a:extLst>
-              <a:ext uri="{FF2B5EF4-FFF2-40B4-BE49-F238E27FC236}">
-                <a16:creationId xmlns:a16="http://schemas.microsoft.com/office/drawing/2014/main" id="{594176FC-CDFC-61FB-E70B-B94C0AEB7833}"/>
+          <p:cNvPr id="10" name="Rechteck 9">
+            <a:extLst>
+              <a:ext uri="{FF2B5EF4-FFF2-40B4-BE49-F238E27FC236}">
+                <a16:creationId xmlns:a16="http://schemas.microsoft.com/office/drawing/2014/main" id="{3BDAF42C-D0D3-7226-1CEE-EBC5C46C4547}"/>
               </a:ext>
             </a:extLst>
           </p:cNvPr>
@@ -5658,18 +5514,19 @@
         </p:nvSpPr>
         <p:spPr>
           <a:xfrm>
-            <a:off x="3268979" y="2115979"/>
-            <a:ext cx="2827021" cy="2679503"/>
+            <a:off x="9551159" y="1500503"/>
+            <a:ext cx="235436" cy="245098"/>
           </a:xfrm>
           <a:prstGeom prst="rect">
             <a:avLst/>
           </a:prstGeom>
-          <a:noFill/>
-          <a:ln>
+          <a:solidFill>
+            <a:schemeClr val="bg1"/>
+          </a:solidFill>
+          <a:ln w="38100">
             <a:solidFill>
               <a:schemeClr val="tx1"/>
             </a:solidFill>
-            <a:prstDash val="dashDot"/>
           </a:ln>
         </p:spPr>
         <p:style>
@@ -5699,278 +5556,62 @@
       </p:sp>
       <p:sp>
         <p:nvSpPr>
-          <p:cNvPr id="21" name="Textfeld 20">
-            <a:extLst>
-              <a:ext uri="{FF2B5EF4-FFF2-40B4-BE49-F238E27FC236}">
-                <a16:creationId xmlns:a16="http://schemas.microsoft.com/office/drawing/2014/main" id="{106A6628-246B-0CF0-757C-7ADF5571D43D}"/>
-              </a:ext>
-            </a:extLst>
-          </p:cNvPr>
-          <p:cNvSpPr txBox="1"/>
+          <p:cNvPr id="11" name="Rechteck 10">
+            <a:extLst>
+              <a:ext uri="{FF2B5EF4-FFF2-40B4-BE49-F238E27FC236}">
+                <a16:creationId xmlns:a16="http://schemas.microsoft.com/office/drawing/2014/main" id="{196E9938-4A62-AE08-D728-664636770F41}"/>
+              </a:ext>
+            </a:extLst>
+          </p:cNvPr>
+          <p:cNvSpPr/>
           <p:nvPr/>
         </p:nvSpPr>
         <p:spPr>
           <a:xfrm>
-            <a:off x="3268978" y="2209324"/>
-            <a:ext cx="1323019" cy="369332"/>
+            <a:off x="9232218" y="1500503"/>
+            <a:ext cx="235436" cy="245098"/>
           </a:xfrm>
           <a:prstGeom prst="rect">
             <a:avLst/>
           </a:prstGeom>
-          <a:noFill/>
+          <a:solidFill>
+            <a:schemeClr val="bg1"/>
+          </a:solidFill>
+          <a:ln w="38100">
+            <a:solidFill>
+              <a:schemeClr val="tx1"/>
+            </a:solidFill>
+          </a:ln>
         </p:spPr>
-        <p:txBody>
-          <a:bodyPr wrap="square" rtlCol="0">
-            <a:spAutoFit/>
-          </a:bodyPr>
-          <a:lstStyle/>
-          <a:p>
-            <a:r>
-              <a:rPr lang="de-DE" dirty="0"/>
-              <a:t>Label:</a:t>
-            </a:r>
-          </a:p>
-        </p:txBody>
-      </p:sp>
-      <p:sp>
-        <p:nvSpPr>
-          <p:cNvPr id="22" name="Textfeld 21">
-            <a:extLst>
-              <a:ext uri="{FF2B5EF4-FFF2-40B4-BE49-F238E27FC236}">
-                <a16:creationId xmlns:a16="http://schemas.microsoft.com/office/drawing/2014/main" id="{D280021D-AB85-0490-D9F3-7E8ADFB80AA1}"/>
-              </a:ext>
-            </a:extLst>
-          </p:cNvPr>
-          <p:cNvSpPr txBox="1"/>
-          <p:nvPr/>
-        </p:nvSpPr>
-        <p:spPr>
-          <a:xfrm>
-            <a:off x="4591998" y="2209324"/>
-            <a:ext cx="1504001" cy="369332"/>
-          </a:xfrm>
-          <a:prstGeom prst="rect">
-            <a:avLst/>
-          </a:prstGeom>
-          <a:noFill/>
-        </p:spPr>
-        <p:txBody>
-          <a:bodyPr wrap="square" rtlCol="0">
-            <a:spAutoFit/>
-          </a:bodyPr>
-          <a:lstStyle/>
-          <a:p>
-            <a:r>
-              <a:rPr lang="de-DE" dirty="0"/>
-              <a:t>„</a:t>
-            </a:r>
-            <a:r>
-              <a:rPr lang="de-DE" dirty="0" err="1"/>
-              <a:t>NameString</a:t>
-            </a:r>
-            <a:r>
-              <a:rPr lang="de-DE" dirty="0"/>
-              <a:t>“</a:t>
-            </a:r>
+        <p:style>
+          <a:lnRef idx="2">
+            <a:schemeClr val="accent1">
+              <a:shade val="15000"/>
+            </a:schemeClr>
+          </a:lnRef>
+          <a:fillRef idx="1">
+            <a:schemeClr val="accent1"/>
+          </a:fillRef>
+          <a:effectRef idx="0">
+            <a:schemeClr val="accent1"/>
+          </a:effectRef>
+          <a:fontRef idx="minor">
+            <a:schemeClr val="lt1"/>
+          </a:fontRef>
+        </p:style>
+        <p:txBody>
+          <a:bodyPr rtlCol="0" anchor="ctr"/>
+          <a:lstStyle/>
+          <a:p>
+            <a:pPr algn="ctr"/>
+            <a:endParaRPr lang="de-DE"/>
           </a:p>
         </p:txBody>
       </p:sp>
     </p:spTree>
     <p:extLst>
       <p:ext uri="{BB962C8B-B14F-4D97-AF65-F5344CB8AC3E}">
-        <p14:creationId xmlns:p14="http://schemas.microsoft.com/office/powerpoint/2010/main" val="3377676410"/>
-      </p:ext>
-    </p:extLst>
-  </p:cSld>
-  <p:clrMapOvr>
-    <a:masterClrMapping/>
-  </p:clrMapOvr>
-</p:sld>
-</file>
-
-<file path=ppt/slides/slide4.xml><?xml version="1.0" encoding="utf-8"?>
-<p:sld xmlns:a="http://schemas.openxmlformats.org/drawingml/2006/main" xmlns:r="http://schemas.openxmlformats.org/officeDocument/2006/relationships" xmlns:p="http://schemas.openxmlformats.org/presentationml/2006/main">
-  <p:cSld>
-    <p:spTree>
-      <p:nvGrpSpPr>
-        <p:cNvPr id="1" name=""/>
-        <p:cNvGrpSpPr/>
-        <p:nvPr/>
-      </p:nvGrpSpPr>
-      <p:grpSpPr>
-        <a:xfrm>
-          <a:off x="0" y="0"/>
-          <a:ext cx="0" cy="0"/>
-          <a:chOff x="0" y="0"/>
-          <a:chExt cx="0" cy="0"/>
-        </a:xfrm>
-      </p:grpSpPr>
-      <p:sp>
-        <p:nvSpPr>
-          <p:cNvPr id="2" name="Titel 1">
-            <a:extLst>
-              <a:ext uri="{FF2B5EF4-FFF2-40B4-BE49-F238E27FC236}">
-                <a16:creationId xmlns:a16="http://schemas.microsoft.com/office/drawing/2014/main" id="{E12E6281-2E4C-B5E8-2D7E-A366D53F9D4A}"/>
-              </a:ext>
-            </a:extLst>
-          </p:cNvPr>
-          <p:cNvSpPr>
-            <a:spLocks noGrp="1"/>
-          </p:cNvSpPr>
-          <p:nvPr>
-            <p:ph type="title"/>
-          </p:nvPr>
-        </p:nvSpPr>
-        <p:spPr/>
-        <p:txBody>
-          <a:bodyPr/>
-          <a:lstStyle/>
-          <a:p>
-            <a:r>
-              <a:rPr lang="de-DE" dirty="0"/>
-              <a:t>Save </a:t>
-            </a:r>
-            <a:r>
-              <a:rPr lang="de-DE" dirty="0" err="1"/>
-              <a:t>buffer</a:t>
-            </a:r>
-            <a:r>
-              <a:rPr lang="de-DE" dirty="0"/>
-              <a:t>	</a:t>
-            </a:r>
-          </a:p>
-        </p:txBody>
-      </p:sp>
-      <p:sp>
-        <p:nvSpPr>
-          <p:cNvPr id="3" name="Inhaltsplatzhalter 2">
-            <a:extLst>
-              <a:ext uri="{FF2B5EF4-FFF2-40B4-BE49-F238E27FC236}">
-                <a16:creationId xmlns:a16="http://schemas.microsoft.com/office/drawing/2014/main" id="{B95F4190-D485-EB74-2211-B0EC73F77165}"/>
-              </a:ext>
-            </a:extLst>
-          </p:cNvPr>
-          <p:cNvSpPr>
-            <a:spLocks noGrp="1"/>
-          </p:cNvSpPr>
-          <p:nvPr>
-            <p:ph idx="1"/>
-          </p:nvPr>
-        </p:nvSpPr>
-        <p:spPr/>
-        <p:txBody>
-          <a:bodyPr/>
-          <a:lstStyle/>
-          <a:p>
-            <a:r>
-              <a:rPr lang="de-DE" dirty="0"/>
-              <a:t>Add </a:t>
-            </a:r>
-            <a:r>
-              <a:rPr lang="de-DE" dirty="0" err="1"/>
-              <a:t>entry</a:t>
-            </a:r>
-            <a:r>
-              <a:rPr lang="de-DE" dirty="0"/>
-              <a:t> </a:t>
-            </a:r>
-            <a:r>
-              <a:rPr lang="de-DE" dirty="0" err="1"/>
-              <a:t>added</a:t>
-            </a:r>
-            <a:r>
-              <a:rPr lang="de-DE" dirty="0"/>
-              <a:t> </a:t>
-            </a:r>
-            <a:r>
-              <a:rPr lang="de-DE" dirty="0" err="1"/>
-              <a:t>during</a:t>
-            </a:r>
-            <a:r>
-              <a:rPr lang="de-DE" dirty="0"/>
-              <a:t> in a </a:t>
-            </a:r>
-            <a:r>
-              <a:rPr lang="de-DE" dirty="0" err="1"/>
-              <a:t>list</a:t>
-            </a:r>
-            <a:r>
-              <a:rPr lang="de-DE" dirty="0"/>
-              <a:t>&lt;</a:t>
-            </a:r>
-            <a:r>
-              <a:rPr lang="de-DE" dirty="0" err="1"/>
-              <a:t>string</a:t>
-            </a:r>
-            <a:r>
-              <a:rPr lang="de-DE" dirty="0"/>
-              <a:t>&gt;</a:t>
-            </a:r>
-          </a:p>
-          <a:p>
-            <a:r>
-              <a:rPr lang="de-DE" dirty="0" err="1"/>
-              <a:t>Added</a:t>
-            </a:r>
-            <a:r>
-              <a:rPr lang="de-DE" dirty="0"/>
-              <a:t> </a:t>
-            </a:r>
-            <a:r>
-              <a:rPr lang="de-DE" dirty="0" err="1"/>
-              <a:t>entry</a:t>
-            </a:r>
-            <a:r>
-              <a:rPr lang="de-DE" dirty="0"/>
-              <a:t> </a:t>
-            </a:r>
-            <a:r>
-              <a:rPr lang="de-DE" dirty="0" err="1"/>
-              <a:t>needs</a:t>
-            </a:r>
-            <a:r>
-              <a:rPr lang="de-DE" dirty="0"/>
-              <a:t> to </a:t>
-            </a:r>
-            <a:r>
-              <a:rPr lang="de-DE" dirty="0" err="1"/>
-              <a:t>get</a:t>
-            </a:r>
-            <a:r>
-              <a:rPr lang="de-DE" dirty="0"/>
-              <a:t> </a:t>
-            </a:r>
-            <a:r>
-              <a:rPr lang="de-DE" dirty="0" err="1"/>
-              <a:t>the</a:t>
-            </a:r>
-            <a:r>
-              <a:rPr lang="de-DE" dirty="0"/>
-              <a:t> </a:t>
-            </a:r>
-            <a:r>
-              <a:rPr lang="de-DE" dirty="0" err="1"/>
-              <a:t>file</a:t>
-            </a:r>
-            <a:r>
-              <a:rPr lang="de-DE" dirty="0"/>
-              <a:t> </a:t>
-            </a:r>
-            <a:r>
-              <a:rPr lang="de-DE" dirty="0" err="1"/>
-              <a:t>extension</a:t>
-            </a:r>
-            <a:endParaRPr lang="de-DE" dirty="0"/>
-          </a:p>
-          <a:p>
-            <a:endParaRPr lang="de-DE" dirty="0"/>
-          </a:p>
-        </p:txBody>
-      </p:sp>
-    </p:spTree>
-    <p:extLst>
-      <p:ext uri="{BB962C8B-B14F-4D97-AF65-F5344CB8AC3E}">
-        <p14:creationId xmlns:p14="http://schemas.microsoft.com/office/powerpoint/2010/main" val="1637764307"/>
+        <p14:creationId xmlns:p14="http://schemas.microsoft.com/office/powerpoint/2010/main" val="163141615"/>
       </p:ext>
     </p:extLst>
   </p:cSld>

</xml_diff>